<commit_message>
move gimp2 to gimp
</commit_message>
<xml_diff>
--- a/gimp.pptx
+++ b/gimp.pptx
@@ -11,20 +11,23 @@
     <p:sldId id="258" r:id="rId5"/>
     <p:sldId id="299" r:id="rId6"/>
     <p:sldId id="298" r:id="rId7"/>
-    <p:sldId id="300" r:id="rId8"/>
-    <p:sldId id="301" r:id="rId9"/>
-    <p:sldId id="302" r:id="rId10"/>
-    <p:sldId id="303" r:id="rId11"/>
+    <p:sldId id="319" r:id="rId8"/>
+    <p:sldId id="300" r:id="rId9"/>
+    <p:sldId id="301" r:id="rId10"/>
+    <p:sldId id="302" r:id="rId11"/>
     <p:sldId id="304" r:id="rId12"/>
     <p:sldId id="269" r:id="rId13"/>
-    <p:sldId id="305" r:id="rId14"/>
-    <p:sldId id="306" r:id="rId15"/>
-    <p:sldId id="311" r:id="rId16"/>
-    <p:sldId id="307" r:id="rId17"/>
-    <p:sldId id="308" r:id="rId18"/>
-    <p:sldId id="310" r:id="rId19"/>
-    <p:sldId id="277" r:id="rId20"/>
-    <p:sldId id="276" r:id="rId21"/>
+    <p:sldId id="320" r:id="rId14"/>
+    <p:sldId id="305" r:id="rId15"/>
+    <p:sldId id="314" r:id="rId16"/>
+    <p:sldId id="312" r:id="rId17"/>
+    <p:sldId id="313" r:id="rId18"/>
+    <p:sldId id="311" r:id="rId19"/>
+    <p:sldId id="317" r:id="rId20"/>
+    <p:sldId id="316" r:id="rId21"/>
+    <p:sldId id="310" r:id="rId22"/>
+    <p:sldId id="277" r:id="rId23"/>
+    <p:sldId id="276" r:id="rId24"/>
   </p:sldIdLst>
   <p:sldSz cx="9144000" cy="6858000" type="screen4x3"/>
   <p:notesSz cx="6858000" cy="9144000"/>
@@ -185,10 +188,10 @@
           </a:lstStyle>
           <a:p>
             <a:r>
-              <a:rPr kumimoji="0" lang="ja-JP" altLang="en-US" smtClean="0"/>
+              <a:rPr kumimoji="0" lang="ja-JP" altLang="en-US" dirty="0" smtClean="0"/>
               <a:t>マスター タイトルの書式設定</a:t>
             </a:r>
-            <a:endParaRPr kumimoji="0" lang="en-US"/>
+            <a:endParaRPr kumimoji="0" lang="en-US" dirty="0"/>
           </a:p>
         </p:txBody>
       </p:sp>
@@ -276,7 +279,7 @@
           <a:p>
             <a:fld id="{39378AC4-C49C-4159-B332-7738B007311C}" type="datetimeFigureOut">
               <a:rPr kumimoji="1" lang="ja-JP" altLang="en-US" smtClean="0"/>
-              <a:t>2016/7/4</a:t>
+              <a:t>2016/7/7</a:t>
             </a:fld>
             <a:endParaRPr kumimoji="1" lang="ja-JP" altLang="en-US"/>
           </a:p>
@@ -621,7 +624,7 @@
           <a:p>
             <a:fld id="{39378AC4-C49C-4159-B332-7738B007311C}" type="datetimeFigureOut">
               <a:rPr kumimoji="1" lang="ja-JP" altLang="en-US" smtClean="0"/>
-              <a:t>2016/7/4</a:t>
+              <a:t>2016/7/7</a:t>
             </a:fld>
             <a:endParaRPr kumimoji="1" lang="ja-JP" altLang="en-US"/>
           </a:p>
@@ -838,7 +841,7 @@
           <a:p>
             <a:fld id="{39378AC4-C49C-4159-B332-7738B007311C}" type="datetimeFigureOut">
               <a:rPr kumimoji="1" lang="ja-JP" altLang="en-US" smtClean="0"/>
-              <a:t>2016/7/4</a:t>
+              <a:t>2016/7/7</a:t>
             </a:fld>
             <a:endParaRPr kumimoji="1" lang="ja-JP" altLang="en-US"/>
           </a:p>
@@ -933,10 +936,10 @@
           </a:lstStyle>
           <a:p>
             <a:r>
-              <a:rPr kumimoji="0" lang="ja-JP" altLang="en-US" smtClean="0"/>
+              <a:rPr kumimoji="0" lang="ja-JP" altLang="en-US" dirty="0" smtClean="0"/>
               <a:t>マスター タイトルの書式設定</a:t>
             </a:r>
-            <a:endParaRPr kumimoji="0" lang="en-US"/>
+            <a:endParaRPr kumimoji="0" lang="en-US" dirty="0"/>
           </a:p>
         </p:txBody>
       </p:sp>
@@ -959,70 +962,70 @@
           <a:p>
             <a:pPr lvl="0" eaLnBrk="1" latinLnBrk="0" hangingPunct="1"/>
             <a:r>
-              <a:rPr lang="ja-JP" altLang="en-US" smtClean="0"/>
+              <a:rPr lang="ja-JP" altLang="en-US" dirty="0" smtClean="0"/>
               <a:t>マスター テキストの書式設定</a:t>
             </a:r>
           </a:p>
           <a:p>
             <a:pPr lvl="1" eaLnBrk="1" latinLnBrk="0" hangingPunct="1"/>
             <a:r>
-              <a:rPr lang="ja-JP" altLang="en-US" smtClean="0"/>
+              <a:rPr lang="ja-JP" altLang="en-US" dirty="0" smtClean="0"/>
               <a:t>第 </a:t>
             </a:r>
             <a:r>
-              <a:rPr lang="en-US" altLang="ja-JP" smtClean="0"/>
+              <a:rPr lang="en-US" altLang="ja-JP" dirty="0" smtClean="0"/>
               <a:t>2 </a:t>
             </a:r>
             <a:r>
-              <a:rPr lang="ja-JP" altLang="en-US" smtClean="0"/>
+              <a:rPr lang="ja-JP" altLang="en-US" dirty="0" smtClean="0"/>
               <a:t>レベル</a:t>
             </a:r>
           </a:p>
           <a:p>
             <a:pPr lvl="2" eaLnBrk="1" latinLnBrk="0" hangingPunct="1"/>
             <a:r>
-              <a:rPr lang="ja-JP" altLang="en-US" smtClean="0"/>
+              <a:rPr lang="ja-JP" altLang="en-US" dirty="0" smtClean="0"/>
               <a:t>第 </a:t>
             </a:r>
             <a:r>
-              <a:rPr lang="en-US" altLang="ja-JP" smtClean="0"/>
+              <a:rPr lang="en-US" altLang="ja-JP" dirty="0" smtClean="0"/>
               <a:t>3 </a:t>
             </a:r>
             <a:r>
-              <a:rPr lang="ja-JP" altLang="en-US" smtClean="0"/>
+              <a:rPr lang="ja-JP" altLang="en-US" dirty="0" smtClean="0"/>
               <a:t>レベル</a:t>
             </a:r>
           </a:p>
           <a:p>
             <a:pPr lvl="3" eaLnBrk="1" latinLnBrk="0" hangingPunct="1"/>
             <a:r>
-              <a:rPr lang="ja-JP" altLang="en-US" smtClean="0"/>
+              <a:rPr lang="ja-JP" altLang="en-US" dirty="0" smtClean="0"/>
               <a:t>第 </a:t>
             </a:r>
             <a:r>
-              <a:rPr lang="en-US" altLang="ja-JP" smtClean="0"/>
+              <a:rPr lang="en-US" altLang="ja-JP" dirty="0" smtClean="0"/>
               <a:t>4 </a:t>
             </a:r>
             <a:r>
-              <a:rPr lang="ja-JP" altLang="en-US" smtClean="0"/>
+              <a:rPr lang="ja-JP" altLang="en-US" dirty="0" smtClean="0"/>
               <a:t>レベル</a:t>
             </a:r>
           </a:p>
           <a:p>
             <a:pPr lvl="4" eaLnBrk="1" latinLnBrk="0" hangingPunct="1"/>
             <a:r>
-              <a:rPr lang="ja-JP" altLang="en-US" smtClean="0"/>
+              <a:rPr lang="ja-JP" altLang="en-US" dirty="0" smtClean="0"/>
               <a:t>第 </a:t>
             </a:r>
             <a:r>
-              <a:rPr lang="en-US" altLang="ja-JP" smtClean="0"/>
+              <a:rPr lang="en-US" altLang="ja-JP" dirty="0" smtClean="0"/>
               <a:t>5 </a:t>
             </a:r>
             <a:r>
-              <a:rPr lang="ja-JP" altLang="en-US" smtClean="0"/>
+              <a:rPr lang="ja-JP" altLang="en-US" dirty="0" smtClean="0"/>
               <a:t>レベル</a:t>
             </a:r>
-            <a:endParaRPr kumimoji="0" lang="en-US"/>
+            <a:endParaRPr kumimoji="0" lang="en-US" dirty="0"/>
           </a:p>
         </p:txBody>
       </p:sp>
@@ -1045,7 +1048,7 @@
           <a:p>
             <a:fld id="{39378AC4-C49C-4159-B332-7738B007311C}" type="datetimeFigureOut">
               <a:rPr kumimoji="1" lang="ja-JP" altLang="en-US" smtClean="0"/>
-              <a:t>2016/7/4</a:t>
+              <a:t>2016/7/7</a:t>
             </a:fld>
             <a:endParaRPr kumimoji="1" lang="ja-JP" altLang="en-US"/>
           </a:p>
@@ -1313,7 +1316,7 @@
           <a:p>
             <a:fld id="{39378AC4-C49C-4159-B332-7738B007311C}" type="datetimeFigureOut">
               <a:rPr kumimoji="1" lang="ja-JP" altLang="en-US" smtClean="0"/>
-              <a:t>2016/7/4</a:t>
+              <a:t>2016/7/7</a:t>
             </a:fld>
             <a:endParaRPr kumimoji="1" lang="ja-JP" altLang="en-US"/>
           </a:p>
@@ -1845,7 +1848,7 @@
           <a:p>
             <a:fld id="{39378AC4-C49C-4159-B332-7738B007311C}" type="datetimeFigureOut">
               <a:rPr kumimoji="1" lang="ja-JP" altLang="en-US" smtClean="0"/>
-              <a:t>2016/7/4</a:t>
+              <a:t>2016/7/7</a:t>
             </a:fld>
             <a:endParaRPr kumimoji="1" lang="ja-JP" altLang="en-US"/>
           </a:p>
@@ -2398,7 +2401,7 @@
           <a:p>
             <a:fld id="{39378AC4-C49C-4159-B332-7738B007311C}" type="datetimeFigureOut">
               <a:rPr kumimoji="1" lang="ja-JP" altLang="en-US" smtClean="0"/>
-              <a:t>2016/7/4</a:t>
+              <a:t>2016/7/7</a:t>
             </a:fld>
             <a:endParaRPr kumimoji="1" lang="ja-JP" altLang="en-US"/>
           </a:p>
@@ -2524,7 +2527,7 @@
           <a:p>
             <a:fld id="{39378AC4-C49C-4159-B332-7738B007311C}" type="datetimeFigureOut">
               <a:rPr kumimoji="1" lang="ja-JP" altLang="en-US" smtClean="0"/>
-              <a:t>2016/7/4</a:t>
+              <a:t>2016/7/7</a:t>
             </a:fld>
             <a:endParaRPr kumimoji="1" lang="ja-JP" altLang="en-US"/>
           </a:p>
@@ -2668,7 +2671,7 @@
           <a:p>
             <a:fld id="{39378AC4-C49C-4159-B332-7738B007311C}" type="datetimeFigureOut">
               <a:rPr kumimoji="1" lang="ja-JP" altLang="en-US" smtClean="0"/>
-              <a:t>2016/7/4</a:t>
+              <a:t>2016/7/7</a:t>
             </a:fld>
             <a:endParaRPr kumimoji="1" lang="ja-JP" altLang="en-US"/>
           </a:p>
@@ -3022,7 +3025,7 @@
           <a:p>
             <a:fld id="{39378AC4-C49C-4159-B332-7738B007311C}" type="datetimeFigureOut">
               <a:rPr kumimoji="1" lang="ja-JP" altLang="en-US" smtClean="0"/>
-              <a:t>2016/7/4</a:t>
+              <a:t>2016/7/7</a:t>
             </a:fld>
             <a:endParaRPr kumimoji="1" lang="ja-JP" altLang="en-US"/>
           </a:p>
@@ -3156,7 +3159,7 @@
           <a:p>
             <a:fld id="{39378AC4-C49C-4159-B332-7738B007311C}" type="datetimeFigureOut">
               <a:rPr kumimoji="1" lang="ja-JP" altLang="en-US" smtClean="0"/>
-              <a:t>2016/7/4</a:t>
+              <a:t>2016/7/7</a:t>
             </a:fld>
             <a:endParaRPr kumimoji="1" lang="ja-JP" altLang="en-US"/>
           </a:p>
@@ -3969,7 +3972,7 @@
           <a:p>
             <a:fld id="{39378AC4-C49C-4159-B332-7738B007311C}" type="datetimeFigureOut">
               <a:rPr kumimoji="1" lang="ja-JP" altLang="en-US" smtClean="0"/>
-              <a:t>2016/7/4</a:t>
+              <a:t>2016/7/7</a:t>
             </a:fld>
             <a:endParaRPr kumimoji="1" lang="ja-JP" altLang="en-US"/>
           </a:p>
@@ -4488,33 +4491,73 @@
           <a:lstStyle/>
           <a:p>
             <a:r>
-              <a:rPr lang="en-US" altLang="ja-JP" dirty="0" smtClean="0"/>
+              <a:rPr lang="en-US" altLang="ja-JP" dirty="0" smtClean="0">
+                <a:latin typeface="Meiryo UI" panose="020B0604030504040204" pitchFamily="50" charset="-128"/>
+                <a:ea typeface="Meiryo UI" panose="020B0604030504040204" pitchFamily="50" charset="-128"/>
+                <a:cs typeface="Meiryo UI" panose="020B0604030504040204" pitchFamily="50" charset="-128"/>
+              </a:rPr>
               <a:t>GIMP</a:t>
             </a:r>
             <a:r>
-              <a:rPr lang="ja-JP" altLang="en-US" dirty="0" smtClean="0"/>
+              <a:rPr lang="ja-JP" altLang="en-US" dirty="0" smtClean="0">
+                <a:latin typeface="Meiryo UI" panose="020B0604030504040204" pitchFamily="50" charset="-128"/>
+                <a:ea typeface="Meiryo UI" panose="020B0604030504040204" pitchFamily="50" charset="-128"/>
+                <a:cs typeface="Meiryo UI" panose="020B0604030504040204" pitchFamily="50" charset="-128"/>
+              </a:rPr>
               <a:t>を使ってみた</a:t>
             </a:r>
             <a:r>
-              <a:rPr lang="en-US" altLang="ja-JP" dirty="0" smtClean="0"/>
+              <a:rPr lang="en-US" altLang="ja-JP" dirty="0" smtClean="0">
+                <a:latin typeface="Meiryo UI" panose="020B0604030504040204" pitchFamily="50" charset="-128"/>
+                <a:ea typeface="Meiryo UI" panose="020B0604030504040204" pitchFamily="50" charset="-128"/>
+                <a:cs typeface="Meiryo UI" panose="020B0604030504040204" pitchFamily="50" charset="-128"/>
+              </a:rPr>
               <a:t/>
             </a:r>
             <a:br>
-              <a:rPr lang="en-US" altLang="ja-JP" dirty="0" smtClean="0"/>
+              <a:rPr lang="en-US" altLang="ja-JP" dirty="0" smtClean="0">
+                <a:latin typeface="Meiryo UI" panose="020B0604030504040204" pitchFamily="50" charset="-128"/>
+                <a:ea typeface="Meiryo UI" panose="020B0604030504040204" pitchFamily="50" charset="-128"/>
+                <a:cs typeface="Meiryo UI" panose="020B0604030504040204" pitchFamily="50" charset="-128"/>
+              </a:rPr>
             </a:br>
             <a:r>
-              <a:rPr lang="ja-JP" altLang="en-US" dirty="0" smtClean="0"/>
+              <a:rPr lang="ja-JP" altLang="en-US" dirty="0" smtClean="0">
+                <a:latin typeface="Meiryo UI" panose="020B0604030504040204" pitchFamily="50" charset="-128"/>
+                <a:ea typeface="Meiryo UI" panose="020B0604030504040204" pitchFamily="50" charset="-128"/>
+                <a:cs typeface="Meiryo UI" panose="020B0604030504040204" pitchFamily="50" charset="-128"/>
+              </a:rPr>
               <a:t>　　</a:t>
             </a:r>
             <a:r>
-              <a:rPr lang="en-US" altLang="ja-JP" dirty="0" smtClean="0"/>
+              <a:rPr lang="en-US" altLang="ja-JP" dirty="0" smtClean="0">
+                <a:latin typeface="Meiryo UI" panose="020B0604030504040204" pitchFamily="50" charset="-128"/>
+                <a:ea typeface="Meiryo UI" panose="020B0604030504040204" pitchFamily="50" charset="-128"/>
+                <a:cs typeface="Meiryo UI" panose="020B0604030504040204" pitchFamily="50" charset="-128"/>
+              </a:rPr>
               <a:t>+Scheme</a:t>
             </a:r>
             <a:r>
-              <a:rPr lang="ja-JP" altLang="en-US" dirty="0" smtClean="0"/>
+              <a:rPr lang="ja-JP" altLang="en-US" dirty="0" smtClean="0">
+                <a:latin typeface="Meiryo UI" panose="020B0604030504040204" pitchFamily="50" charset="-128"/>
+                <a:ea typeface="Meiryo UI" panose="020B0604030504040204" pitchFamily="50" charset="-128"/>
+                <a:cs typeface="Meiryo UI" panose="020B0604030504040204" pitchFamily="50" charset="-128"/>
+              </a:rPr>
               <a:t>言語</a:t>
             </a:r>
-            <a:endParaRPr kumimoji="1" lang="ja-JP" altLang="en-US" dirty="0"/>
+            <a:r>
+              <a:rPr lang="ja-JP" altLang="en-US" sz="2000" dirty="0" smtClean="0">
+                <a:latin typeface="Meiryo UI" panose="020B0604030504040204" pitchFamily="50" charset="-128"/>
+                <a:ea typeface="Meiryo UI" panose="020B0604030504040204" pitchFamily="50" charset="-128"/>
+                <a:cs typeface="Meiryo UI" panose="020B0604030504040204" pitchFamily="50" charset="-128"/>
+              </a:rPr>
+              <a:t>を使いたかった</a:t>
+            </a:r>
+            <a:endParaRPr kumimoji="1" lang="ja-JP" altLang="en-US" sz="2000" dirty="0">
+              <a:latin typeface="Meiryo UI" panose="020B0604030504040204" pitchFamily="50" charset="-128"/>
+              <a:ea typeface="Meiryo UI" panose="020B0604030504040204" pitchFamily="50" charset="-128"/>
+              <a:cs typeface="Meiryo UI" panose="020B0604030504040204" pitchFamily="50" charset="-128"/>
+            </a:endParaRPr>
           </a:p>
         </p:txBody>
       </p:sp>
@@ -4539,16 +4582,28 @@
           <a:lstStyle/>
           <a:p>
             <a:r>
-              <a:rPr kumimoji="1" lang="en-US" altLang="ja-JP" dirty="0" smtClean="0"/>
+              <a:rPr kumimoji="1" lang="en-US" altLang="ja-JP" dirty="0" smtClean="0">
+                <a:latin typeface="Meiryo UI" panose="020B0604030504040204" pitchFamily="50" charset="-128"/>
+                <a:ea typeface="Meiryo UI" panose="020B0604030504040204" pitchFamily="50" charset="-128"/>
+                <a:cs typeface="Meiryo UI" panose="020B0604030504040204" pitchFamily="50" charset="-128"/>
+              </a:rPr>
               <a:t>2016/7</a:t>
             </a:r>
           </a:p>
           <a:p>
             <a:r>
-              <a:rPr kumimoji="1" lang="ja-JP" altLang="en-US" dirty="0" smtClean="0"/>
+              <a:rPr kumimoji="1" lang="ja-JP" altLang="en-US" dirty="0" smtClean="0">
+                <a:latin typeface="Meiryo UI" panose="020B0604030504040204" pitchFamily="50" charset="-128"/>
+                <a:ea typeface="Meiryo UI" panose="020B0604030504040204" pitchFamily="50" charset="-128"/>
+                <a:cs typeface="Meiryo UI" panose="020B0604030504040204" pitchFamily="50" charset="-128"/>
+              </a:rPr>
               <a:t>ちそう）鈴木</a:t>
             </a:r>
-            <a:endParaRPr kumimoji="1" lang="ja-JP" altLang="en-US" dirty="0"/>
+            <a:endParaRPr kumimoji="1" lang="ja-JP" altLang="en-US" dirty="0">
+              <a:latin typeface="Meiryo UI" panose="020B0604030504040204" pitchFamily="50" charset="-128"/>
+              <a:ea typeface="Meiryo UI" panose="020B0604030504040204" pitchFamily="50" charset="-128"/>
+              <a:cs typeface="Meiryo UI" panose="020B0604030504040204" pitchFamily="50" charset="-128"/>
+            </a:endParaRPr>
           </a:p>
         </p:txBody>
       </p:sp>
@@ -4604,6 +4659,10 @@
           <a:bodyPr/>
           <a:lstStyle/>
           <a:p>
+            <a:r>
+              <a:rPr kumimoji="1" lang="ja-JP" altLang="en-US" dirty="0" smtClean="0"/>
+              <a:t>やりたいこと</a:t>
+            </a:r>
             <a:endParaRPr kumimoji="1" lang="ja-JP" altLang="en-US" dirty="0"/>
           </a:p>
         </p:txBody>
@@ -4630,33 +4689,47 @@
           </a:bodyPr>
           <a:lstStyle/>
           <a:p>
-            <a:pPr marL="82296" indent="0" algn="ctr">
-              <a:buNone/>
-            </a:pPr>
-            <a:endParaRPr kumimoji="1" lang="en-US" altLang="ja-JP" sz="4400" dirty="0" smtClean="0"/>
-          </a:p>
-          <a:p>
-            <a:pPr marL="82296" indent="0" algn="ctr">
-              <a:buNone/>
-            </a:pPr>
-            <a:endParaRPr kumimoji="1" lang="en-US" altLang="ja-JP" sz="4400" dirty="0" smtClean="0"/>
-          </a:p>
-          <a:p>
-            <a:pPr marL="82296" indent="0" algn="ctr">
-              <a:buNone/>
-            </a:pPr>
-            <a:r>
-              <a:rPr kumimoji="1" lang="ja-JP" altLang="en-US" sz="4400" dirty="0" smtClean="0"/>
-              <a:t>レイヤー機能</a:t>
-            </a:r>
-            <a:endParaRPr kumimoji="1" lang="en-US" altLang="ja-JP" sz="4400" dirty="0" smtClean="0"/>
+            <a:pPr marL="82296" indent="0">
+              <a:buNone/>
+            </a:pPr>
+            <a:r>
+              <a:rPr lang="ja-JP" altLang="en-US" sz="3600" dirty="0" smtClean="0"/>
+              <a:t>③モザイク処理とかできたら面白そう</a:t>
+            </a:r>
+            <a:endParaRPr lang="en-US" altLang="ja-JP" sz="3600" dirty="0" smtClean="0"/>
+          </a:p>
+          <a:p>
+            <a:pPr marL="82296" indent="0">
+              <a:buNone/>
+            </a:pPr>
+            <a:endParaRPr lang="en-US" altLang="ja-JP" sz="3600" dirty="0"/>
+          </a:p>
+          <a:p>
+            <a:pPr marL="82296" indent="0">
+              <a:buNone/>
+            </a:pPr>
+            <a:r>
+              <a:rPr lang="ja-JP" altLang="en-US" sz="3600" dirty="0" smtClean="0"/>
+              <a:t>範囲選択→右クリックメニュー</a:t>
+            </a:r>
+            <a:endParaRPr lang="en-US" altLang="ja-JP" sz="3600" dirty="0" smtClean="0"/>
+          </a:p>
+          <a:p>
+            <a:pPr marL="82296" indent="0">
+              <a:buNone/>
+            </a:pPr>
+            <a:r>
+              <a:rPr lang="ja-JP" altLang="en-US" sz="3600" dirty="0" smtClean="0"/>
+              <a:t>→フィルター→ぼかし→モザイク処理</a:t>
+            </a:r>
+            <a:endParaRPr lang="en-US" altLang="ja-JP" sz="3600" dirty="0" smtClean="0"/>
           </a:p>
         </p:txBody>
       </p:sp>
     </p:spTree>
     <p:extLst>
       <p:ext uri="{BB962C8B-B14F-4D97-AF65-F5344CB8AC3E}">
-        <p14:creationId xmlns:p14="http://schemas.microsoft.com/office/powerpoint/2010/main" val="1442090183"/>
+        <p14:creationId xmlns:p14="http://schemas.microsoft.com/office/powerpoint/2010/main" val="2265432557"/>
       </p:ext>
     </p:extLst>
   </p:cSld>
@@ -4705,6 +4778,10 @@
           <a:bodyPr/>
           <a:lstStyle/>
           <a:p>
+            <a:r>
+              <a:rPr kumimoji="1" lang="ja-JP" altLang="en-US" dirty="0" smtClean="0"/>
+              <a:t>その他の特徴</a:t>
+            </a:r>
             <a:endParaRPr kumimoji="1" lang="ja-JP" altLang="en-US" dirty="0"/>
           </a:p>
         </p:txBody>
@@ -4734,6 +4811,26 @@
             <a:pPr marL="82296" indent="0" algn="ctr">
               <a:buNone/>
             </a:pPr>
+            <a:r>
+              <a:rPr kumimoji="1" lang="ja-JP" altLang="en-US" sz="4400" dirty="0" smtClean="0"/>
+              <a:t>独自の保存</a:t>
+            </a:r>
+            <a:r>
+              <a:rPr kumimoji="1" lang="ja-JP" altLang="en-US" sz="4400" dirty="0" smtClean="0"/>
+              <a:t>形式</a:t>
+            </a:r>
+            <a:r>
+              <a:rPr kumimoji="1" lang="en-US" altLang="ja-JP" sz="4400" dirty="0" smtClean="0"/>
+              <a:t>(.</a:t>
+            </a:r>
+            <a:r>
+              <a:rPr kumimoji="1" lang="en-US" altLang="ja-JP" sz="4400" dirty="0" err="1" smtClean="0"/>
+              <a:t>xcf</a:t>
+            </a:r>
+            <a:r>
+              <a:rPr kumimoji="1" lang="en-US" altLang="ja-JP" sz="4400" dirty="0" smtClean="0"/>
+              <a:t>)</a:t>
+            </a:r>
             <a:endParaRPr kumimoji="1" lang="en-US" altLang="ja-JP" sz="4400" dirty="0" smtClean="0"/>
           </a:p>
           <a:p>
@@ -4763,18 +4860,18 @@
               <a:buNone/>
             </a:pPr>
             <a:r>
-              <a:rPr lang="ja-JP" altLang="en-US" sz="1600" dirty="0"/>
+              <a:rPr lang="ja-JP" altLang="en-US" sz="2800" dirty="0"/>
               <a:t>慣れない</a:t>
             </a:r>
             <a:r>
-              <a:rPr lang="ja-JP" altLang="en-US" sz="1600" dirty="0" smtClean="0"/>
+              <a:rPr lang="ja-JP" altLang="en-US" sz="2800" dirty="0" smtClean="0"/>
               <a:t>と</a:t>
             </a:r>
             <a:r>
-              <a:rPr lang="ja-JP" altLang="en-US" sz="1600" dirty="0"/>
+              <a:rPr lang="ja-JP" altLang="en-US" sz="2800" dirty="0"/>
               <a:t>戸惑う</a:t>
             </a:r>
-            <a:endParaRPr kumimoji="1" lang="en-US" altLang="ja-JP" sz="1600" dirty="0" smtClean="0"/>
+            <a:endParaRPr kumimoji="1" lang="en-US" altLang="ja-JP" sz="2800" dirty="0" smtClean="0"/>
           </a:p>
         </p:txBody>
       </p:sp>
@@ -4850,8 +4947,8 @@
         </p:nvSpPr>
         <p:spPr>
           <a:xfrm>
-            <a:off x="1043608" y="1447800"/>
-            <a:ext cx="7890080" cy="5077544"/>
+            <a:off x="1043608" y="1124744"/>
+            <a:ext cx="7890080" cy="5733256"/>
           </a:xfrm>
         </p:spPr>
         <p:txBody>
@@ -4862,7 +4959,49 @@
           <a:p>
             <a:r>
               <a:rPr kumimoji="1" lang="ja-JP" altLang="en-US" dirty="0" smtClean="0"/>
-              <a:t>多機能</a:t>
+              <a:t>多機能で色々できそう</a:t>
+            </a:r>
+            <a:endParaRPr kumimoji="1" lang="en-US" altLang="ja-JP" dirty="0" smtClean="0"/>
+          </a:p>
+          <a:p>
+            <a:endParaRPr lang="en-US" altLang="ja-JP" dirty="0"/>
+          </a:p>
+          <a:p>
+            <a:r>
+              <a:rPr kumimoji="1" lang="ja-JP" altLang="en-US" dirty="0" smtClean="0"/>
+              <a:t>半面、多機能すぎて一部</a:t>
+            </a:r>
+            <a:r>
+              <a:rPr kumimoji="1" lang="ja-JP" altLang="en-US" dirty="0" smtClean="0"/>
+              <a:t>の作業</a:t>
+            </a:r>
+            <a:r>
+              <a:rPr kumimoji="1" lang="ja-JP" altLang="en-US" dirty="0" smtClean="0"/>
+              <a:t>は</a:t>
+            </a:r>
+            <a:endParaRPr kumimoji="1" lang="en-US" altLang="ja-JP" dirty="0" smtClean="0"/>
+          </a:p>
+          <a:p>
+            <a:pPr marL="82296" indent="0">
+              <a:buNone/>
+            </a:pPr>
+            <a:r>
+              <a:rPr kumimoji="1" lang="ja-JP" altLang="en-US" dirty="0" smtClean="0"/>
+              <a:t>　ペイント</a:t>
+            </a:r>
+            <a:r>
+              <a:rPr kumimoji="1" lang="ja-JP" altLang="en-US" dirty="0" smtClean="0"/>
+              <a:t>のほうが楽かも</a:t>
+            </a:r>
+            <a:endParaRPr kumimoji="1" lang="en-US" altLang="ja-JP" dirty="0" smtClean="0"/>
+          </a:p>
+          <a:p>
+            <a:endParaRPr lang="en-US" altLang="ja-JP" dirty="0"/>
+          </a:p>
+          <a:p>
+            <a:r>
+              <a:rPr kumimoji="1" lang="ja-JP" altLang="en-US" dirty="0" smtClean="0"/>
+              <a:t>起動が遅いし結構落ちる</a:t>
             </a:r>
             <a:endParaRPr kumimoji="1" lang="en-US" altLang="ja-JP" dirty="0" smtClean="0"/>
           </a:p>
@@ -4933,10 +5072,6 @@
           <a:bodyPr/>
           <a:lstStyle/>
           <a:p>
-            <a:r>
-              <a:rPr kumimoji="1" lang="en-US" altLang="ja-JP" dirty="0" smtClean="0"/>
-              <a:t>Script-Fu</a:t>
-            </a:r>
             <a:endParaRPr kumimoji="1" lang="ja-JP" altLang="en-US" dirty="0"/>
           </a:p>
         </p:txBody>
@@ -4953,8 +5088,8 @@
         </p:nvSpPr>
         <p:spPr>
           <a:xfrm>
-            <a:off x="1115616" y="1124744"/>
-            <a:ext cx="7818072" cy="5544616"/>
+            <a:off x="899592" y="1447800"/>
+            <a:ext cx="8136904" cy="4069432"/>
           </a:xfrm>
         </p:spPr>
         <p:txBody>
@@ -4963,89 +5098,33 @@
           </a:bodyPr>
           <a:lstStyle/>
           <a:p>
-            <a:pPr marL="82296" indent="0">
-              <a:buNone/>
-            </a:pPr>
-            <a:r>
-              <a:rPr lang="en-US" altLang="ja-JP" dirty="0" smtClean="0"/>
-              <a:t>GIMP</a:t>
-            </a:r>
-            <a:r>
-              <a:rPr lang="ja-JP" altLang="en-US" dirty="0" smtClean="0"/>
-              <a:t>の自動化スクリプト</a:t>
-            </a:r>
-            <a:endParaRPr lang="en-US" altLang="ja-JP" dirty="0"/>
-          </a:p>
-          <a:p>
-            <a:pPr marL="82296" indent="0">
-              <a:buNone/>
-            </a:pPr>
-            <a:r>
-              <a:rPr lang="en-US" altLang="ja-JP" dirty="0" smtClean="0"/>
-              <a:t>Scheme</a:t>
-            </a:r>
-            <a:r>
-              <a:rPr lang="ja-JP" altLang="en-US" dirty="0" smtClean="0"/>
-              <a:t>言語で記述する</a:t>
-            </a:r>
-            <a:r>
-              <a:rPr lang="ja-JP" altLang="en-US" dirty="0" smtClean="0"/>
-              <a:t>。</a:t>
-            </a:r>
-            <a:endParaRPr lang="en-US" altLang="ja-JP" dirty="0" smtClean="0"/>
-          </a:p>
-          <a:p>
-            <a:pPr marL="82296" indent="0">
-              <a:buNone/>
-            </a:pPr>
-            <a:endParaRPr lang="en-US" altLang="ja-JP" dirty="0"/>
-          </a:p>
-          <a:p>
-            <a:pPr marL="82296" indent="0">
-              <a:buNone/>
-            </a:pPr>
-            <a:r>
-              <a:rPr lang="en-US" altLang="ja-JP" dirty="0" smtClean="0"/>
-              <a:t>GIMP</a:t>
-            </a:r>
-            <a:r>
-              <a:rPr lang="ja-JP" altLang="en-US" dirty="0" smtClean="0"/>
-              <a:t>に対話型コンソールあり</a:t>
-            </a:r>
-            <a:endParaRPr lang="en-US" altLang="ja-JP" dirty="0"/>
-          </a:p>
-          <a:p>
-            <a:pPr marL="82296" indent="0">
-              <a:buNone/>
-            </a:pPr>
-            <a:endParaRPr lang="en-US" altLang="ja-JP" dirty="0" smtClean="0"/>
-          </a:p>
-          <a:p>
-            <a:pPr marL="82296" indent="0">
-              <a:buNone/>
-            </a:pPr>
-            <a:endParaRPr lang="en-US" altLang="ja-JP" dirty="0"/>
-          </a:p>
-          <a:p>
-            <a:pPr marL="82296" indent="0">
-              <a:buNone/>
-            </a:pPr>
-            <a:r>
-              <a:rPr lang="en-US" altLang="ja-JP" dirty="0" err="1" smtClean="0"/>
-              <a:t>Python,Perl,Tcl,Ruby</a:t>
-            </a:r>
-            <a:r>
-              <a:rPr lang="ja-JP" altLang="en-US" dirty="0" smtClean="0"/>
-              <a:t>の拡張もあるらしい</a:t>
-            </a:r>
-            <a:endParaRPr lang="en-US" altLang="ja-JP" dirty="0" smtClean="0"/>
+            <a:pPr marL="82296" indent="0" algn="ctr">
+              <a:buNone/>
+            </a:pPr>
+            <a:endParaRPr kumimoji="1" lang="en-US" altLang="ja-JP" sz="4400" dirty="0" smtClean="0"/>
+          </a:p>
+          <a:p>
+            <a:pPr marL="82296" indent="0" algn="ctr">
+              <a:buNone/>
+            </a:pPr>
+            <a:endParaRPr kumimoji="1" lang="en-US" altLang="ja-JP" sz="4400" dirty="0" smtClean="0"/>
+          </a:p>
+          <a:p>
+            <a:pPr marL="82296" indent="0" algn="ctr">
+              <a:buNone/>
+            </a:pPr>
+            <a:r>
+              <a:rPr kumimoji="1" lang="ja-JP" altLang="en-US" sz="4400" dirty="0" smtClean="0"/>
+              <a:t>スクリプト機能について調べた</a:t>
+            </a:r>
+            <a:endParaRPr kumimoji="1" lang="en-US" altLang="ja-JP" sz="4400" dirty="0" smtClean="0"/>
           </a:p>
         </p:txBody>
       </p:sp>
     </p:spTree>
     <p:extLst>
       <p:ext uri="{BB962C8B-B14F-4D97-AF65-F5344CB8AC3E}">
-        <p14:creationId xmlns:p14="http://schemas.microsoft.com/office/powerpoint/2010/main" val="3588803410"/>
+        <p14:creationId xmlns:p14="http://schemas.microsoft.com/office/powerpoint/2010/main" val="2475628937"/>
       </p:ext>
     </p:extLst>
   </p:cSld>
@@ -5096,11 +5175,7 @@
           <a:p>
             <a:r>
               <a:rPr kumimoji="1" lang="en-US" altLang="ja-JP" dirty="0" smtClean="0"/>
-              <a:t>Scheme</a:t>
-            </a:r>
-            <a:r>
-              <a:rPr kumimoji="1" lang="ja-JP" altLang="en-US" dirty="0" smtClean="0"/>
-              <a:t>言語</a:t>
+              <a:t>Script-Fu</a:t>
             </a:r>
             <a:endParaRPr kumimoji="1" lang="ja-JP" altLang="en-US" dirty="0"/>
           </a:p>
@@ -5133,28 +5208,58 @@
             </a:pPr>
             <a:r>
               <a:rPr lang="en-US" altLang="ja-JP" dirty="0" smtClean="0"/>
-              <a:t>Lisp</a:t>
+              <a:t>GIMP</a:t>
             </a:r>
             <a:r>
               <a:rPr lang="ja-JP" altLang="en-US" dirty="0" smtClean="0"/>
-              <a:t>の方言の一つで、現在でもよく使われる</a:t>
-            </a:r>
+              <a:t>の自動化スクリプト</a:t>
+            </a:r>
+            <a:endParaRPr lang="en-US" altLang="ja-JP" dirty="0"/>
+          </a:p>
+          <a:p>
+            <a:pPr marL="82296" indent="0">
+              <a:buNone/>
+            </a:pPr>
+            <a:r>
+              <a:rPr lang="en-US" altLang="ja-JP" dirty="0" smtClean="0"/>
+              <a:t>Scheme</a:t>
+            </a:r>
+            <a:r>
+              <a:rPr lang="ja-JP" altLang="en-US" dirty="0" smtClean="0"/>
+              <a:t>言語で記述する。</a:t>
+            </a:r>
+            <a:endParaRPr lang="en-US" altLang="ja-JP" dirty="0"/>
+          </a:p>
+          <a:p>
+            <a:pPr marL="82296" indent="0">
+              <a:buNone/>
+            </a:pPr>
             <a:endParaRPr lang="en-US" altLang="ja-JP" dirty="0" smtClean="0"/>
           </a:p>
           <a:p>
             <a:pPr marL="82296" indent="0">
               <a:buNone/>
             </a:pPr>
+            <a:r>
+              <a:rPr lang="en-US" altLang="ja-JP" dirty="0"/>
+              <a:t>GIMP</a:t>
+            </a:r>
+            <a:r>
+              <a:rPr lang="ja-JP" altLang="en-US" dirty="0"/>
+              <a:t>に対話型コンソールあり</a:t>
+            </a:r>
+            <a:endParaRPr lang="en-US" altLang="ja-JP" dirty="0"/>
+          </a:p>
+          <a:p>
+            <a:pPr marL="82296" indent="0">
+              <a:buNone/>
+            </a:pPr>
             <a:endParaRPr lang="en-US" altLang="ja-JP" dirty="0" smtClean="0"/>
           </a:p>
           <a:p>
             <a:pPr marL="82296" indent="0">
               <a:buNone/>
             </a:pPr>
-            <a:r>
-              <a:rPr lang="en-US" altLang="ja-JP" dirty="0" smtClean="0"/>
-              <a:t>Lisp</a:t>
-            </a:r>
             <a:endParaRPr lang="en-US" altLang="ja-JP" dirty="0"/>
           </a:p>
           <a:p>
@@ -5162,37 +5267,21 @@
               <a:buNone/>
             </a:pPr>
             <a:r>
+              <a:rPr lang="en-US" altLang="ja-JP" dirty="0" err="1" smtClean="0"/>
+              <a:t>Python,Perl,Tcl,Ruby</a:t>
+            </a:r>
+            <a:r>
               <a:rPr lang="ja-JP" altLang="en-US" dirty="0" smtClean="0"/>
-              <a:t>・なんか古い言語</a:t>
+              <a:t>の拡張もあるらしい</a:t>
             </a:r>
             <a:endParaRPr lang="en-US" altLang="ja-JP" dirty="0" smtClean="0"/>
-          </a:p>
-          <a:p>
-            <a:pPr marL="82296" indent="0">
-              <a:buNone/>
-            </a:pPr>
-            <a:r>
-              <a:rPr lang="ja-JP" altLang="en-US" dirty="0" smtClean="0"/>
-              <a:t>・括弧で囲う</a:t>
-            </a:r>
-            <a:endParaRPr lang="en-US" altLang="ja-JP" dirty="0"/>
-          </a:p>
-          <a:p>
-            <a:pPr marL="82296" indent="0">
-              <a:buNone/>
-            </a:pPr>
-            <a:r>
-              <a:rPr lang="ja-JP" altLang="en-US" dirty="0" smtClean="0"/>
-              <a:t>・ポーランド記法</a:t>
-            </a:r>
-            <a:endParaRPr lang="en-US" altLang="ja-JP" dirty="0"/>
           </a:p>
         </p:txBody>
       </p:sp>
     </p:spTree>
     <p:extLst>
       <p:ext uri="{BB962C8B-B14F-4D97-AF65-F5344CB8AC3E}">
-        <p14:creationId xmlns:p14="http://schemas.microsoft.com/office/powerpoint/2010/main" val="2649384623"/>
+        <p14:creationId xmlns:p14="http://schemas.microsoft.com/office/powerpoint/2010/main" val="3588803410"/>
       </p:ext>
     </p:extLst>
   </p:cSld>
@@ -5280,7 +5369,27 @@
             </a:pPr>
             <a:r>
               <a:rPr lang="en-US" altLang="ja-JP" dirty="0" smtClean="0"/>
-              <a:t>1+2+3</a:t>
+              <a:t>Lisp</a:t>
+            </a:r>
+            <a:r>
+              <a:rPr lang="ja-JP" altLang="en-US" dirty="0" smtClean="0"/>
+              <a:t>の方言の一つで、現在でもよく使われる</a:t>
+            </a:r>
+            <a:endParaRPr lang="en-US" altLang="ja-JP" dirty="0" smtClean="0"/>
+          </a:p>
+          <a:p>
+            <a:pPr marL="82296" indent="0">
+              <a:buNone/>
+            </a:pPr>
+            <a:endParaRPr lang="en-US" altLang="ja-JP" dirty="0" smtClean="0"/>
+          </a:p>
+          <a:p>
+            <a:pPr marL="82296" indent="0">
+              <a:buNone/>
+            </a:pPr>
+            <a:r>
+              <a:rPr lang="en-US" altLang="ja-JP" dirty="0" smtClean="0"/>
+              <a:t>Lisp</a:t>
             </a:r>
             <a:endParaRPr lang="en-US" altLang="ja-JP" dirty="0"/>
           </a:p>
@@ -5289,14 +5398,9 @@
               <a:buNone/>
             </a:pPr>
             <a:r>
-              <a:rPr lang="en-US" altLang="ja-JP" dirty="0" smtClean="0"/>
-              <a:t>(+ 1 2 3)</a:t>
-            </a:r>
-          </a:p>
-          <a:p>
-            <a:pPr marL="82296" indent="0">
-              <a:buNone/>
-            </a:pPr>
+              <a:rPr lang="ja-JP" altLang="en-US" dirty="0" smtClean="0"/>
+              <a:t>・なんか古い言語</a:t>
+            </a:r>
             <a:endParaRPr lang="en-US" altLang="ja-JP" dirty="0" smtClean="0"/>
           </a:p>
           <a:p>
@@ -5304,39 +5408,27 @@
               <a:buNone/>
             </a:pPr>
             <a:r>
-              <a:rPr lang="en-US" altLang="ja-JP" dirty="0"/>
-              <a:t>3</a:t>
-            </a:r>
-            <a:r>
-              <a:rPr lang="ja-JP" altLang="en-US" dirty="0" err="1"/>
-              <a:t>つの</a:t>
-            </a:r>
-            <a:r>
-              <a:rPr lang="ja-JP" altLang="en-US" dirty="0"/>
-              <a:t>引数を取る関数</a:t>
-            </a:r>
-            <a:r>
-              <a:rPr lang="en-US" altLang="ja-JP" dirty="0" smtClean="0"/>
-              <a:t>f</a:t>
-            </a:r>
-          </a:p>
-          <a:p>
-            <a:pPr marL="82296" indent="0">
-              <a:buNone/>
-            </a:pPr>
-            <a:r>
-              <a:rPr lang="en-US" altLang="ja-JP" dirty="0" smtClean="0"/>
-              <a:t>(</a:t>
-            </a:r>
-            <a:r>
-              <a:rPr lang="en-US" altLang="ja-JP" dirty="0"/>
-              <a:t>f arg1 arg2 arg3)</a:t>
-            </a:r>
-          </a:p>
-          <a:p>
-            <a:pPr marL="82296" indent="0">
-              <a:buNone/>
-            </a:pPr>
+              <a:rPr lang="ja-JP" altLang="en-US" dirty="0" smtClean="0"/>
+              <a:t>・括弧で</a:t>
+            </a:r>
+            <a:r>
+              <a:rPr lang="ja-JP" altLang="en-US" dirty="0" smtClean="0"/>
+              <a:t>囲う。</a:t>
+            </a:r>
+            <a:r>
+              <a:rPr lang="ja-JP" altLang="en-US" dirty="0" smtClean="0"/>
+              <a:t>やたらと括弧が多くなる</a:t>
+            </a:r>
+            <a:endParaRPr lang="en-US" altLang="ja-JP" dirty="0"/>
+          </a:p>
+          <a:p>
+            <a:pPr marL="82296" indent="0">
+              <a:buNone/>
+            </a:pPr>
+            <a:r>
+              <a:rPr lang="ja-JP" altLang="en-US" dirty="0" smtClean="0"/>
+              <a:t>・ポーランド記法</a:t>
+            </a:r>
             <a:endParaRPr lang="en-US" altLang="ja-JP" dirty="0"/>
           </a:p>
         </p:txBody>
@@ -5344,7 +5436,7 @@
     </p:spTree>
     <p:extLst>
       <p:ext uri="{BB962C8B-B14F-4D97-AF65-F5344CB8AC3E}">
-        <p14:creationId xmlns:p14="http://schemas.microsoft.com/office/powerpoint/2010/main" val="4091024264"/>
+        <p14:creationId xmlns:p14="http://schemas.microsoft.com/office/powerpoint/2010/main" val="3143071365"/>
       </p:ext>
     </p:extLst>
   </p:cSld>
@@ -5430,6 +5522,22 @@
             <a:pPr marL="82296" indent="0">
               <a:buNone/>
             </a:pPr>
+            <a:r>
+              <a:rPr lang="ja-JP" altLang="en-US" dirty="0" smtClean="0"/>
+              <a:t>・</a:t>
+            </a:r>
+            <a:r>
+              <a:rPr lang="en-US" altLang="ja-JP" dirty="0" smtClean="0"/>
+              <a:t>1+2+3</a:t>
+            </a:r>
+            <a:r>
+              <a:rPr lang="ja-JP" altLang="en-US" dirty="0" err="1" smtClean="0"/>
+              <a:t>のような</a:t>
+            </a:r>
+            <a:r>
+              <a:rPr lang="ja-JP" altLang="en-US" dirty="0" smtClean="0"/>
+              <a:t>計算</a:t>
+            </a:r>
             <a:endParaRPr lang="en-US" altLang="ja-JP" dirty="0" smtClean="0"/>
           </a:p>
           <a:p>
@@ -5437,9 +5545,136 @@
               <a:buNone/>
             </a:pPr>
             <a:r>
-              <a:rPr lang="ja-JP" altLang="en-US" dirty="0"/>
-              <a:t>こんなかんじになりました</a:t>
-            </a:r>
+              <a:rPr lang="en-US" altLang="ja-JP" dirty="0" smtClean="0"/>
+              <a:t>(+ </a:t>
+            </a:r>
+            <a:r>
+              <a:rPr lang="en-US" altLang="ja-JP" dirty="0"/>
+              <a:t>1 2 3)</a:t>
+            </a:r>
+          </a:p>
+          <a:p>
+            <a:pPr marL="82296" indent="0">
+              <a:buNone/>
+            </a:pPr>
+            <a:endParaRPr lang="en-US" altLang="ja-JP" dirty="0" smtClean="0"/>
+          </a:p>
+          <a:p>
+            <a:pPr marL="82296" indent="0">
+              <a:buNone/>
+            </a:pPr>
+            <a:endParaRPr lang="en-US" altLang="ja-JP" dirty="0"/>
+          </a:p>
+          <a:p>
+            <a:pPr marL="82296" indent="0">
+              <a:buNone/>
+            </a:pPr>
+            <a:r>
+              <a:rPr lang="ja-JP" altLang="en-US" dirty="0" smtClean="0"/>
+              <a:t>・関数定義</a:t>
+            </a:r>
+            <a:endParaRPr lang="en-US" altLang="ja-JP" dirty="0" smtClean="0"/>
+          </a:p>
+          <a:p>
+            <a:pPr marL="82296" indent="0">
+              <a:buNone/>
+            </a:pPr>
+            <a:r>
+              <a:rPr lang="en-US" altLang="ja-JP" dirty="0" smtClean="0"/>
+              <a:t>(</a:t>
+            </a:r>
+            <a:r>
+              <a:rPr lang="en-US" altLang="ja-JP" dirty="0"/>
+              <a:t>define (</a:t>
+            </a:r>
+            <a:r>
+              <a:rPr lang="en-US" altLang="ja-JP" dirty="0" err="1"/>
+              <a:t>AddXY</a:t>
+            </a:r>
+            <a:r>
+              <a:rPr lang="en-US" altLang="ja-JP" dirty="0"/>
+              <a:t> </a:t>
+            </a:r>
+            <a:r>
+              <a:rPr lang="en-US" altLang="ja-JP" dirty="0" err="1"/>
+              <a:t>inX</a:t>
+            </a:r>
+            <a:r>
+              <a:rPr lang="en-US" altLang="ja-JP" dirty="0"/>
+              <a:t> </a:t>
+            </a:r>
+            <a:r>
+              <a:rPr lang="en-US" altLang="ja-JP" dirty="0" err="1"/>
+              <a:t>inY</a:t>
+            </a:r>
+            <a:r>
+              <a:rPr lang="en-US" altLang="ja-JP" dirty="0"/>
+              <a:t>) (+ </a:t>
+            </a:r>
+            <a:r>
+              <a:rPr lang="en-US" altLang="ja-JP" dirty="0" err="1"/>
+              <a:t>inX</a:t>
+            </a:r>
+            <a:r>
+              <a:rPr lang="en-US" altLang="ja-JP" dirty="0"/>
+              <a:t> </a:t>
+            </a:r>
+            <a:r>
+              <a:rPr lang="en-US" altLang="ja-JP" dirty="0" err="1"/>
+              <a:t>inY</a:t>
+            </a:r>
+            <a:r>
+              <a:rPr lang="en-US" altLang="ja-JP" dirty="0"/>
+              <a:t>) </a:t>
+            </a:r>
+            <a:r>
+              <a:rPr lang="en-US" altLang="ja-JP" dirty="0" smtClean="0"/>
+              <a:t>)</a:t>
+            </a:r>
+          </a:p>
+          <a:p>
+            <a:pPr marL="82296" indent="0">
+              <a:buNone/>
+            </a:pPr>
+            <a:endParaRPr lang="en-US" altLang="ja-JP" dirty="0"/>
+          </a:p>
+          <a:p>
+            <a:pPr marL="82296" indent="0">
+              <a:buNone/>
+            </a:pPr>
+            <a:r>
+              <a:rPr lang="en-US" altLang="ja-JP" dirty="0" smtClean="0"/>
+              <a:t>(</a:t>
+            </a:r>
+            <a:r>
+              <a:rPr lang="en-US" altLang="ja-JP" dirty="0" err="1" smtClean="0"/>
+              <a:t>AddXY</a:t>
+            </a:r>
+            <a:r>
+              <a:rPr lang="en-US" altLang="ja-JP" dirty="0" smtClean="0"/>
+              <a:t> 4 5)</a:t>
+            </a:r>
+          </a:p>
+          <a:p>
+            <a:pPr marL="82296" indent="0">
+              <a:buNone/>
+            </a:pPr>
+            <a:r>
+              <a:rPr lang="en-US" altLang="ja-JP" dirty="0" smtClean="0"/>
+              <a:t>&gt;9</a:t>
+            </a:r>
+            <a:endParaRPr lang="en-US" altLang="ja-JP" dirty="0" smtClean="0"/>
+          </a:p>
+          <a:p>
+            <a:pPr marL="82296" indent="0">
+              <a:buNone/>
+            </a:pPr>
+            <a:endParaRPr lang="en-US" altLang="ja-JP" dirty="0"/>
+          </a:p>
+          <a:p>
+            <a:pPr marL="82296" indent="0">
+              <a:buNone/>
+            </a:pPr>
             <a:endParaRPr lang="en-US" altLang="ja-JP" dirty="0"/>
           </a:p>
         </p:txBody>
@@ -5447,7 +5682,7 @@
     </p:spTree>
     <p:extLst>
       <p:ext uri="{BB962C8B-B14F-4D97-AF65-F5344CB8AC3E}">
-        <p14:creationId xmlns:p14="http://schemas.microsoft.com/office/powerpoint/2010/main" val="3258046168"/>
+        <p14:creationId xmlns:p14="http://schemas.microsoft.com/office/powerpoint/2010/main" val="487478770"/>
       </p:ext>
     </p:extLst>
   </p:cSld>
@@ -5497,12 +5732,8 @@
           <a:lstStyle/>
           <a:p>
             <a:r>
-              <a:rPr kumimoji="1" lang="en-US" altLang="ja-JP" dirty="0" smtClean="0"/>
-              <a:t>Scheme</a:t>
-            </a:r>
-            <a:r>
-              <a:rPr kumimoji="1" lang="ja-JP" altLang="en-US" dirty="0" smtClean="0"/>
-              <a:t>言語</a:t>
+              <a:rPr lang="ja-JP" altLang="en-US" dirty="0" smtClean="0"/>
+              <a:t>スクリプトの登録</a:t>
             </a:r>
             <a:endParaRPr kumimoji="1" lang="ja-JP" altLang="en-US" dirty="0"/>
           </a:p>
@@ -5520,8 +5751,8 @@
         </p:nvSpPr>
         <p:spPr>
           <a:xfrm>
-            <a:off x="1115616" y="1124744"/>
-            <a:ext cx="7818072" cy="5544616"/>
+            <a:off x="899592" y="1124744"/>
+            <a:ext cx="8244408" cy="5733256"/>
           </a:xfrm>
         </p:spPr>
         <p:txBody>
@@ -5533,6 +5764,24 @@
             <a:pPr marL="82296" indent="0">
               <a:buNone/>
             </a:pPr>
+            <a:r>
+              <a:rPr lang="ja-JP" altLang="en-US" dirty="0" smtClean="0"/>
+              <a:t>所定のスクリプト</a:t>
+            </a:r>
+            <a:r>
+              <a:rPr lang="ja-JP" altLang="en-US" dirty="0" smtClean="0"/>
+              <a:t>格納</a:t>
+            </a:r>
+            <a:r>
+              <a:rPr lang="ja-JP" altLang="en-US" dirty="0" smtClean="0"/>
+              <a:t>場所にファイルを入れる</a:t>
+            </a:r>
+            <a:endParaRPr lang="en-US" altLang="ja-JP" dirty="0" smtClean="0"/>
+          </a:p>
+          <a:p>
+            <a:pPr marL="82296" indent="0">
+              <a:buNone/>
+            </a:pPr>
             <a:endParaRPr lang="en-US" altLang="ja-JP" dirty="0"/>
           </a:p>
           <a:p>
@@ -5541,7 +5790,94 @@
             </a:pPr>
             <a:r>
               <a:rPr lang="ja-JP" altLang="en-US" dirty="0" smtClean="0"/>
-              <a:t>動作ミル</a:t>
+              <a:t>・インストーラ版</a:t>
+            </a:r>
+            <a:endParaRPr lang="en-US" altLang="ja-JP" dirty="0" smtClean="0"/>
+          </a:p>
+          <a:p>
+            <a:pPr marL="82296" indent="0">
+              <a:buNone/>
+            </a:pPr>
+            <a:r>
+              <a:rPr lang="en-US" altLang="ja-JP" dirty="0" smtClean="0"/>
+              <a:t>%HOME%/.</a:t>
+            </a:r>
+            <a:r>
+              <a:rPr lang="en-US" altLang="ja-JP" dirty="0" smtClean="0"/>
+              <a:t>gimp-2.8/scripts</a:t>
+            </a:r>
+            <a:endParaRPr lang="en-US" altLang="ja-JP" dirty="0"/>
+          </a:p>
+          <a:p>
+            <a:pPr marL="82296" indent="0">
+              <a:buNone/>
+            </a:pPr>
+            <a:r>
+              <a:rPr lang="ja-JP" altLang="en-US" dirty="0" smtClean="0"/>
+              <a:t>・ポータブル版</a:t>
+            </a:r>
+            <a:endParaRPr lang="en-US" altLang="ja-JP" dirty="0" smtClean="0"/>
+          </a:p>
+          <a:p>
+            <a:pPr marL="82296" indent="0">
+              <a:buNone/>
+            </a:pPr>
+            <a:r>
+              <a:rPr lang="en-US" altLang="ja-JP" dirty="0" smtClean="0"/>
+              <a:t>~/</a:t>
+            </a:r>
+            <a:r>
+              <a:rPr lang="en-US" altLang="ja-JP" dirty="0" err="1" smtClean="0"/>
+              <a:t>GIMPPortable</a:t>
+            </a:r>
+            <a:r>
+              <a:rPr lang="en-US" altLang="ja-JP" dirty="0" smtClean="0"/>
+              <a:t>/Data/.gimp/scripts</a:t>
+            </a:r>
+          </a:p>
+          <a:p>
+            <a:pPr marL="82296" indent="0">
+              <a:buNone/>
+            </a:pPr>
+            <a:endParaRPr lang="en-US" altLang="ja-JP" dirty="0"/>
+          </a:p>
+          <a:p>
+            <a:pPr marL="82296" indent="0">
+              <a:buNone/>
+            </a:pPr>
+            <a:r>
+              <a:rPr lang="ja-JP" altLang="en-US" dirty="0" smtClean="0"/>
+              <a:t>フィルター→</a:t>
+            </a:r>
+            <a:r>
+              <a:rPr lang="en-US" altLang="ja-JP" dirty="0" smtClean="0"/>
+              <a:t>Script-Fu</a:t>
+            </a:r>
+            <a:r>
+              <a:rPr lang="ja-JP" altLang="en-US" dirty="0" smtClean="0"/>
+              <a:t>→スクリプトを</a:t>
+            </a:r>
+            <a:r>
+              <a:rPr lang="ja-JP" altLang="en-US" dirty="0" smtClean="0"/>
+              <a:t>再読み込み</a:t>
+            </a:r>
+            <a:endParaRPr lang="en-US" altLang="ja-JP" dirty="0" smtClean="0"/>
+          </a:p>
+          <a:p>
+            <a:pPr marL="82296" indent="0">
+              <a:buNone/>
+            </a:pPr>
+            <a:r>
+              <a:rPr lang="ja-JP" altLang="en-US" dirty="0" smtClean="0"/>
+              <a:t>で、</a:t>
+            </a:r>
+            <a:r>
+              <a:rPr lang="en-US" altLang="ja-JP" dirty="0" smtClean="0"/>
+              <a:t>GIMP</a:t>
+            </a:r>
+            <a:r>
+              <a:rPr lang="ja-JP" altLang="en-US" dirty="0" smtClean="0"/>
+              <a:t>メニューにスクリプトが登録される</a:t>
             </a:r>
             <a:endParaRPr lang="en-US" altLang="ja-JP" dirty="0" smtClean="0"/>
           </a:p>
@@ -5550,7 +5886,7 @@
     </p:spTree>
     <p:extLst>
       <p:ext uri="{BB962C8B-B14F-4D97-AF65-F5344CB8AC3E}">
-        <p14:creationId xmlns:p14="http://schemas.microsoft.com/office/powerpoint/2010/main" val="3258046168"/>
+        <p14:creationId xmlns:p14="http://schemas.microsoft.com/office/powerpoint/2010/main" val="4150371520"/>
       </p:ext>
     </p:extLst>
   </p:cSld>
@@ -5594,14 +5930,27 @@
             <p:ph type="title"/>
           </p:nvPr>
         </p:nvSpPr>
-        <p:spPr/>
+        <p:spPr>
+          <a:xfrm>
+            <a:off x="1435608" y="27856"/>
+            <a:ext cx="7498080" cy="1143000"/>
+          </a:xfrm>
+        </p:spPr>
         <p:txBody>
           <a:bodyPr/>
           <a:lstStyle/>
           <a:p>
             <a:r>
-              <a:rPr kumimoji="1" lang="ja-JP" altLang="en-US" dirty="0" smtClean="0"/>
-              <a:t>感想２</a:t>
+              <a:rPr lang="en-US" altLang="ja-JP" dirty="0" smtClean="0"/>
+              <a:t>GIMP</a:t>
+            </a:r>
+            <a:r>
+              <a:rPr lang="ja-JP" altLang="en-US" dirty="0" err="1" smtClean="0"/>
+              <a:t>に登</a:t>
+            </a:r>
+            <a:r>
+              <a:rPr lang="ja-JP" altLang="en-US" dirty="0" smtClean="0"/>
+              <a:t>録するためのお作法</a:t>
             </a:r>
             <a:endParaRPr kumimoji="1" lang="ja-JP" altLang="en-US" dirty="0"/>
           </a:p>
@@ -5609,7 +5958,7 @@
       </p:sp>
       <p:sp>
         <p:nvSpPr>
-          <p:cNvPr id="6" name="コンテンツ プレースホルダー 2"/>
+          <p:cNvPr id="3" name="コンテンツ プレースホルダー 2"/>
           <p:cNvSpPr>
             <a:spLocks noGrp="1"/>
           </p:cNvSpPr>
@@ -5619,54 +5968,369 @@
         </p:nvSpPr>
         <p:spPr>
           <a:xfrm>
-            <a:off x="1043608" y="1447800"/>
-            <a:ext cx="7890080" cy="5077544"/>
+            <a:off x="1115616" y="877962"/>
+            <a:ext cx="7818072" cy="5980038"/>
           </a:xfrm>
         </p:spPr>
         <p:txBody>
           <a:bodyPr>
-            <a:normAutofit/>
+            <a:normAutofit fontScale="62500" lnSpcReduction="20000"/>
           </a:bodyPr>
           <a:lstStyle/>
           <a:p>
-            <a:r>
-              <a:rPr kumimoji="1" lang="ja-JP" altLang="en-US" dirty="0" smtClean="0"/>
-              <a:t>多機能</a:t>
-            </a:r>
-            <a:endParaRPr kumimoji="1" lang="en-US" altLang="ja-JP" dirty="0" smtClean="0"/>
-          </a:p>
-          <a:p>
+            <a:pPr marL="82296" indent="0">
+              <a:buNone/>
+            </a:pPr>
+            <a:r>
+              <a:rPr lang="en-US" altLang="ja-JP" dirty="0" smtClean="0"/>
+              <a:t>(</a:t>
+            </a:r>
+            <a:r>
+              <a:rPr lang="en-US" altLang="ja-JP" dirty="0"/>
+              <a:t>script-</a:t>
+            </a:r>
+            <a:r>
+              <a:rPr lang="en-US" altLang="ja-JP" dirty="0" err="1"/>
+              <a:t>fu</a:t>
+            </a:r>
+            <a:r>
+              <a:rPr lang="en-US" altLang="ja-JP" dirty="0"/>
+              <a:t>-register</a:t>
+            </a:r>
+          </a:p>
+          <a:p>
+            <a:pPr marL="82296" indent="0">
+              <a:buNone/>
+            </a:pPr>
+            <a:r>
+              <a:rPr lang="en-US" altLang="ja-JP" dirty="0"/>
+              <a:t>  "script-</a:t>
+            </a:r>
+            <a:r>
+              <a:rPr lang="en-US" altLang="ja-JP" dirty="0" err="1"/>
+              <a:t>fu</a:t>
+            </a:r>
+            <a:r>
+              <a:rPr lang="en-US" altLang="ja-JP" dirty="0"/>
+              <a:t>-text-box"                        ;</a:t>
+            </a:r>
+            <a:r>
+              <a:rPr lang="en-US" altLang="ja-JP" dirty="0" err="1"/>
+              <a:t>func</a:t>
+            </a:r>
+            <a:r>
+              <a:rPr lang="en-US" altLang="ja-JP" dirty="0"/>
+              <a:t> name</a:t>
+            </a:r>
+          </a:p>
+          <a:p>
+            <a:pPr marL="82296" indent="0">
+              <a:buNone/>
+            </a:pPr>
+            <a:r>
+              <a:rPr lang="en-US" altLang="ja-JP" dirty="0"/>
+              <a:t>  </a:t>
+            </a:r>
+            <a:r>
+              <a:rPr lang="en-US" altLang="ja-JP" dirty="0" smtClean="0"/>
+              <a:t>“</a:t>
+            </a:r>
+            <a:r>
+              <a:rPr lang="en-US" altLang="ja-JP" dirty="0" smtClean="0">
+                <a:solidFill>
+                  <a:srgbClr val="FF0000"/>
+                </a:solidFill>
+              </a:rPr>
+              <a:t>Sample Script </a:t>
+            </a:r>
+            <a:r>
+              <a:rPr lang="en-US" altLang="ja-JP" dirty="0" err="1" smtClean="0">
+                <a:solidFill>
+                  <a:srgbClr val="FF0000"/>
+                </a:solidFill>
+              </a:rPr>
+              <a:t>Hoge</a:t>
+            </a:r>
+            <a:r>
+              <a:rPr lang="en-US" altLang="ja-JP" dirty="0" smtClean="0"/>
+              <a:t>"                     </a:t>
+            </a:r>
+            <a:r>
+              <a:rPr lang="en-US" altLang="ja-JP" dirty="0"/>
+              <a:t>;menu label</a:t>
+            </a:r>
+          </a:p>
+          <a:p>
+            <a:pPr marL="82296" indent="0">
+              <a:buNone/>
+            </a:pPr>
+            <a:r>
+              <a:rPr lang="en-US" altLang="ja-JP" dirty="0"/>
+              <a:t>  </a:t>
+            </a:r>
+            <a:r>
+              <a:rPr lang="en-US" altLang="ja-JP" dirty="0" smtClean="0"/>
+              <a:t>“Sample."              </a:t>
+            </a:r>
+            <a:r>
+              <a:rPr lang="en-US" altLang="ja-JP" dirty="0"/>
+              <a:t>;description</a:t>
+            </a:r>
+          </a:p>
+          <a:p>
+            <a:pPr marL="82296" indent="0">
+              <a:buNone/>
+            </a:pPr>
+            <a:r>
+              <a:rPr lang="en-US" altLang="ja-JP" dirty="0"/>
+              <a:t>  </a:t>
+            </a:r>
+            <a:r>
+              <a:rPr lang="en-US" altLang="ja-JP" dirty="0" smtClean="0"/>
+              <a:t>“Suzuki bot"                             </a:t>
+            </a:r>
+            <a:r>
+              <a:rPr lang="en-US" altLang="ja-JP" dirty="0"/>
+              <a:t>;author</a:t>
+            </a:r>
+          </a:p>
+          <a:p>
+            <a:pPr marL="82296" indent="0">
+              <a:buNone/>
+            </a:pPr>
+            <a:r>
+              <a:rPr lang="en-US" altLang="ja-JP" dirty="0"/>
+              <a:t>  "copyright </a:t>
+            </a:r>
+            <a:r>
+              <a:rPr lang="en-US" altLang="ja-JP" dirty="0" smtClean="0"/>
+              <a:t>2016 </a:t>
+            </a:r>
+            <a:r>
+              <a:rPr lang="en-US" altLang="ja-JP" dirty="0" err="1" smtClean="0"/>
+              <a:t>hogehoge</a:t>
+            </a:r>
+            <a:r>
+              <a:rPr lang="en-US" altLang="ja-JP" dirty="0" smtClean="0"/>
+              <a:t>"        </a:t>
+            </a:r>
+            <a:r>
+              <a:rPr lang="en-US" altLang="ja-JP" dirty="0"/>
+              <a:t>;copyright notice</a:t>
+            </a:r>
+          </a:p>
+          <a:p>
+            <a:pPr marL="82296" indent="0">
+              <a:buNone/>
+            </a:pPr>
+            <a:r>
+              <a:rPr lang="en-US" altLang="ja-JP" dirty="0"/>
+              <a:t>  </a:t>
+            </a:r>
+            <a:r>
+              <a:rPr lang="en-US" altLang="ja-JP" dirty="0" smtClean="0"/>
+              <a:t>“July 5, 2016"                          </a:t>
+            </a:r>
+            <a:r>
+              <a:rPr lang="en-US" altLang="ja-JP" dirty="0"/>
+              <a:t>;date created</a:t>
+            </a:r>
+          </a:p>
+          <a:p>
+            <a:pPr marL="82296" indent="0">
+              <a:buNone/>
+            </a:pPr>
+            <a:r>
+              <a:rPr lang="en-US" altLang="ja-JP" dirty="0"/>
+              <a:t>  ""                     ;image type that the script works on</a:t>
+            </a:r>
+          </a:p>
+          <a:p>
+            <a:pPr marL="82296" indent="0">
+              <a:buNone/>
+            </a:pPr>
+            <a:r>
+              <a:rPr lang="en-US" altLang="ja-JP" dirty="0"/>
+              <a:t>  SF-STRING </a:t>
+            </a:r>
+            <a:r>
+              <a:rPr lang="en-US" altLang="ja-JP" dirty="0" smtClean="0"/>
+              <a:t>  </a:t>
+            </a:r>
+            <a:r>
+              <a:rPr lang="en-US" altLang="ja-JP" dirty="0"/>
+              <a:t>"Text"     </a:t>
+            </a:r>
+            <a:r>
+              <a:rPr lang="en-US" altLang="ja-JP" dirty="0" smtClean="0"/>
+              <a:t>   </a:t>
+            </a:r>
+            <a:r>
+              <a:rPr lang="en-US" altLang="ja-JP" dirty="0"/>
+              <a:t>"Text Box"   ;a string variable</a:t>
+            </a:r>
+          </a:p>
+          <a:p>
+            <a:pPr marL="82296" indent="0">
+              <a:buNone/>
+            </a:pPr>
+            <a:r>
+              <a:rPr lang="en-US" altLang="ja-JP" dirty="0"/>
+              <a:t>  SF-FONT    </a:t>
+            </a:r>
+            <a:r>
+              <a:rPr lang="en-US" altLang="ja-JP" dirty="0" smtClean="0"/>
+              <a:t>  </a:t>
+            </a:r>
+            <a:r>
+              <a:rPr lang="en-US" altLang="ja-JP" dirty="0"/>
+              <a:t>"Font"     </a:t>
+            </a:r>
+            <a:r>
+              <a:rPr lang="en-US" altLang="ja-JP" dirty="0" smtClean="0"/>
+              <a:t>   </a:t>
+            </a:r>
+            <a:r>
+              <a:rPr lang="en-US" altLang="ja-JP" dirty="0"/>
+              <a:t>"Charter"    ;a font variable</a:t>
+            </a:r>
+          </a:p>
+          <a:p>
+            <a:pPr marL="82296" indent="0">
+              <a:buNone/>
+            </a:pPr>
+            <a:r>
+              <a:rPr lang="en-US" altLang="ja-JP" dirty="0"/>
+              <a:t>  SF-ADJUSTMENT  "Font size"     '(50 1 1000 1 10 0 1)</a:t>
+            </a:r>
+          </a:p>
+          <a:p>
+            <a:pPr marL="82296" indent="0">
+              <a:buNone/>
+            </a:pPr>
+            <a:r>
+              <a:rPr lang="en-US" altLang="ja-JP" dirty="0"/>
+              <a:t>  ;a spin-button</a:t>
+            </a:r>
+          </a:p>
+          <a:p>
+            <a:pPr marL="82296" indent="0">
+              <a:buNone/>
+            </a:pPr>
+            <a:r>
+              <a:rPr lang="en-US" altLang="ja-JP" dirty="0"/>
+              <a:t>  SF-COLOR       "Color"         '(0 0 0)     ;color variable</a:t>
+            </a:r>
+          </a:p>
+          <a:p>
+            <a:pPr marL="82296" indent="0">
+              <a:buNone/>
+            </a:pPr>
+            <a:r>
+              <a:rPr lang="en-US" altLang="ja-JP" dirty="0"/>
+              <a:t>  )</a:t>
+            </a:r>
+          </a:p>
+          <a:p>
+            <a:pPr marL="82296" indent="0">
+              <a:buNone/>
+            </a:pPr>
+            <a:r>
+              <a:rPr lang="en-US" altLang="ja-JP" dirty="0"/>
+              <a:t>(script-</a:t>
+            </a:r>
+            <a:r>
+              <a:rPr lang="en-US" altLang="ja-JP" dirty="0" err="1"/>
+              <a:t>fu</a:t>
+            </a:r>
+            <a:r>
+              <a:rPr lang="en-US" altLang="ja-JP" dirty="0"/>
+              <a:t>-menu-register "script-</a:t>
+            </a:r>
+            <a:r>
+              <a:rPr lang="en-US" altLang="ja-JP" dirty="0" err="1"/>
+              <a:t>fu</a:t>
+            </a:r>
+            <a:r>
+              <a:rPr lang="en-US" altLang="ja-JP" dirty="0"/>
+              <a:t>-text-box" "</a:t>
+            </a:r>
+            <a:r>
+              <a:rPr lang="en-US" altLang="ja-JP" dirty="0">
+                <a:solidFill>
+                  <a:srgbClr val="FF0000"/>
+                </a:solidFill>
+              </a:rPr>
+              <a:t>&lt;Image&gt;/</a:t>
+            </a:r>
+            <a:r>
+              <a:rPr lang="en-US" altLang="ja-JP" dirty="0" smtClean="0">
+                <a:solidFill>
+                  <a:srgbClr val="FF0000"/>
+                </a:solidFill>
+              </a:rPr>
+              <a:t>File/Create/</a:t>
+            </a:r>
+            <a:r>
+              <a:rPr lang="en-US" altLang="ja-JP" dirty="0" err="1" smtClean="0">
+                <a:solidFill>
+                  <a:srgbClr val="FF0000"/>
+                </a:solidFill>
+              </a:rPr>
+              <a:t>Hoge</a:t>
+            </a:r>
+            <a:r>
+              <a:rPr lang="en-US" altLang="ja-JP" dirty="0" smtClean="0"/>
+              <a:t>")</a:t>
+            </a:r>
+          </a:p>
+          <a:p>
+            <a:pPr marL="82296" indent="0">
+              <a:buNone/>
+            </a:pPr>
             <a:endParaRPr lang="en-US" altLang="ja-JP" dirty="0" smtClean="0"/>
           </a:p>
           <a:p>
-            <a:r>
-              <a:rPr lang="ja-JP" altLang="en-US" dirty="0" smtClean="0"/>
-              <a:t>レイヤー機能、独自保存形式など戸惑う</a:t>
-            </a:r>
-            <a:endParaRPr lang="en-US" altLang="ja-JP" dirty="0" smtClean="0"/>
-          </a:p>
-          <a:p>
-            <a:endParaRPr lang="en-US" altLang="ja-JP" dirty="0"/>
-          </a:p>
-          <a:p>
-            <a:r>
-              <a:rPr lang="ja-JP" altLang="en-US" dirty="0" smtClean="0"/>
-              <a:t>習得に時間がかかりそう</a:t>
-            </a:r>
-            <a:endParaRPr lang="en-US" altLang="ja-JP" dirty="0"/>
+            <a:pPr marL="82296" indent="0">
+              <a:buNone/>
+            </a:pPr>
+            <a:r>
+              <a:rPr lang="en-US" altLang="ja-JP" sz="5100" dirty="0" smtClean="0"/>
+              <a:t>※</a:t>
+            </a:r>
+            <a:r>
+              <a:rPr lang="ja-JP" altLang="en-US" sz="5100" dirty="0" smtClean="0"/>
+              <a:t>赤字が</a:t>
+            </a:r>
+            <a:r>
+              <a:rPr lang="en-US" altLang="ja-JP" sz="5100" dirty="0" smtClean="0"/>
+              <a:t>GIMP</a:t>
+            </a:r>
+            <a:r>
+              <a:rPr lang="ja-JP" altLang="en-US" sz="5100" dirty="0" smtClean="0"/>
+              <a:t>メニュー登録場所になる</a:t>
+            </a:r>
+            <a:endParaRPr lang="en-US" altLang="ja-JP" sz="5100" dirty="0"/>
           </a:p>
         </p:txBody>
       </p:sp>
     </p:spTree>
     <p:extLst>
       <p:ext uri="{BB962C8B-B14F-4D97-AF65-F5344CB8AC3E}">
-        <p14:creationId xmlns:p14="http://schemas.microsoft.com/office/powerpoint/2010/main" val="658832179"/>
+        <p14:creationId xmlns:p14="http://schemas.microsoft.com/office/powerpoint/2010/main" val="3531853651"/>
       </p:ext>
     </p:extLst>
   </p:cSld>
   <p:clrMapOvr>
     <a:masterClrMapping/>
   </p:clrMapOvr>
+  <p:timing>
+    <p:tnLst>
+      <p:par>
+        <p:cTn id="1" dur="indefinite" restart="never" nodeType="tmRoot"/>
+      </p:par>
+    </p:tnLst>
+  </p:timing>
 </p:sld>
 </file>
 
@@ -5689,76 +6353,64 @@
       </p:grpSpPr>
       <p:sp>
         <p:nvSpPr>
-          <p:cNvPr id="3" name="コンテンツ プレースホルダー 2"/>
-          <p:cNvSpPr>
-            <a:spLocks noGrp="1"/>
-          </p:cNvSpPr>
+          <p:cNvPr id="2" name="タイトル 1"/>
+          <p:cNvSpPr>
+            <a:spLocks noGrp="1"/>
+          </p:cNvSpPr>
+          <p:nvPr>
+            <p:ph type="title"/>
+          </p:nvPr>
+        </p:nvSpPr>
+        <p:spPr/>
+        <p:txBody>
+          <a:bodyPr/>
+          <a:lstStyle/>
+          <a:p>
+            <a:r>
+              <a:rPr lang="ja-JP" altLang="en-US" dirty="0" smtClean="0"/>
+              <a:t>なんかできて</a:t>
+            </a:r>
+            <a:r>
+              <a:rPr lang="ja-JP" altLang="en-US" dirty="0"/>
+              <a:t>る</a:t>
+            </a:r>
+            <a:endParaRPr kumimoji="1" lang="ja-JP" altLang="en-US" dirty="0"/>
+          </a:p>
+        </p:txBody>
+      </p:sp>
+      <p:pic>
+        <p:nvPicPr>
+          <p:cNvPr id="4" name="コンテンツ プレースホルダー 3"/>
+          <p:cNvPicPr>
+            <a:picLocks noGrp="1" noChangeAspect="1"/>
+          </p:cNvPicPr>
           <p:nvPr>
             <p:ph idx="1"/>
           </p:nvPr>
-        </p:nvSpPr>
-        <p:spPr/>
-        <p:txBody>
-          <a:bodyPr>
-            <a:normAutofit/>
-          </a:bodyPr>
-          <a:lstStyle/>
-          <a:p>
-            <a:pPr marL="82296" indent="0">
-              <a:buNone/>
-            </a:pPr>
-            <a:r>
-              <a:rPr lang="ja-JP" altLang="en-US" dirty="0" smtClean="0"/>
-              <a:t>日本語ドキュメント</a:t>
-            </a:r>
-            <a:endParaRPr lang="en-US" altLang="ja-JP" dirty="0" smtClean="0"/>
-          </a:p>
-          <a:p>
-            <a:pPr marL="82296" indent="0">
-              <a:buNone/>
-            </a:pPr>
-            <a:r>
-              <a:rPr lang="en-US" altLang="ja-JP" dirty="0"/>
-              <a:t>https://docs.gimp.org/ja/index.html</a:t>
-            </a:r>
-          </a:p>
-          <a:p>
-            <a:pPr marL="82296" indent="0">
-              <a:buNone/>
-            </a:pPr>
-            <a:endParaRPr lang="en-US" altLang="ja-JP" dirty="0" smtClean="0"/>
-          </a:p>
-        </p:txBody>
-      </p:sp>
-      <p:sp>
-        <p:nvSpPr>
-          <p:cNvPr id="4" name="タイトル 3"/>
-          <p:cNvSpPr>
-            <a:spLocks noGrp="1"/>
-          </p:cNvSpPr>
-          <p:nvPr>
-            <p:ph type="title"/>
-          </p:nvPr>
-        </p:nvSpPr>
-        <p:spPr/>
-        <p:txBody>
-          <a:bodyPr>
-            <a:normAutofit/>
-          </a:bodyPr>
-          <a:lstStyle/>
-          <a:p>
-            <a:r>
-              <a:rPr kumimoji="1" lang="ja-JP" altLang="en-US" dirty="0" smtClean="0"/>
-              <a:t>参考</a:t>
-            </a:r>
-            <a:endParaRPr kumimoji="1" lang="ja-JP" altLang="en-US" dirty="0"/>
-          </a:p>
-        </p:txBody>
-      </p:sp>
+        </p:nvPicPr>
+        <p:blipFill>
+          <a:blip r:embed="rId2">
+            <a:extLst>
+              <a:ext uri="{28A0092B-C50C-407E-A947-70E740481C1C}">
+                <a14:useLocalDpi xmlns:a14="http://schemas.microsoft.com/office/drawing/2010/main" val="0"/>
+              </a:ext>
+            </a:extLst>
+          </a:blip>
+          <a:stretch>
+            <a:fillRect/>
+          </a:stretch>
+        </p:blipFill>
+        <p:spPr>
+          <a:xfrm>
+            <a:off x="1763688" y="1312922"/>
+            <a:ext cx="6121307" cy="5543550"/>
+          </a:xfrm>
+        </p:spPr>
+      </p:pic>
     </p:spTree>
     <p:extLst>
       <p:ext uri="{BB962C8B-B14F-4D97-AF65-F5344CB8AC3E}">
-        <p14:creationId xmlns:p14="http://schemas.microsoft.com/office/powerpoint/2010/main" val="3783224327"/>
+        <p14:creationId xmlns:p14="http://schemas.microsoft.com/office/powerpoint/2010/main" val="3558633009"/>
       </p:ext>
     </p:extLst>
   </p:cSld>
@@ -6025,6 +6677,356 @@
       </p:grpSpPr>
       <p:sp>
         <p:nvSpPr>
+          <p:cNvPr id="2" name="タイトル 1"/>
+          <p:cNvSpPr>
+            <a:spLocks noGrp="1"/>
+          </p:cNvSpPr>
+          <p:nvPr>
+            <p:ph type="title"/>
+          </p:nvPr>
+        </p:nvSpPr>
+        <p:spPr/>
+        <p:txBody>
+          <a:bodyPr/>
+          <a:lstStyle/>
+          <a:p>
+            <a:r>
+              <a:rPr kumimoji="1" lang="en-US" altLang="ja-JP" dirty="0" smtClean="0"/>
+              <a:t>Script-Fu</a:t>
+            </a:r>
+            <a:endParaRPr kumimoji="1" lang="ja-JP" altLang="en-US" dirty="0"/>
+          </a:p>
+        </p:txBody>
+      </p:sp>
+      <p:sp>
+        <p:nvSpPr>
+          <p:cNvPr id="3" name="コンテンツ プレースホルダー 2"/>
+          <p:cNvSpPr>
+            <a:spLocks noGrp="1"/>
+          </p:cNvSpPr>
+          <p:nvPr>
+            <p:ph idx="1"/>
+          </p:nvPr>
+        </p:nvSpPr>
+        <p:spPr>
+          <a:xfrm>
+            <a:off x="1115616" y="1124744"/>
+            <a:ext cx="7818072" cy="5544616"/>
+          </a:xfrm>
+        </p:spPr>
+        <p:txBody>
+          <a:bodyPr>
+            <a:normAutofit/>
+          </a:bodyPr>
+          <a:lstStyle/>
+          <a:p>
+            <a:pPr marL="82296" indent="0">
+              <a:buNone/>
+            </a:pPr>
+            <a:endParaRPr lang="en-US" altLang="ja-JP" dirty="0" smtClean="0"/>
+          </a:p>
+          <a:p>
+            <a:pPr marL="82296" indent="0">
+              <a:buNone/>
+            </a:pPr>
+            <a:endParaRPr lang="en-US" altLang="ja-JP" dirty="0"/>
+          </a:p>
+          <a:p>
+            <a:pPr marL="82296" indent="0">
+              <a:buNone/>
+            </a:pPr>
+            <a:endParaRPr lang="en-US" altLang="ja-JP" dirty="0" smtClean="0"/>
+          </a:p>
+          <a:p>
+            <a:pPr marL="82296" indent="0">
+              <a:buNone/>
+            </a:pPr>
+            <a:endParaRPr lang="en-US" altLang="ja-JP" dirty="0"/>
+          </a:p>
+          <a:p>
+            <a:pPr marL="82296" indent="0" algn="ctr">
+              <a:buNone/>
+            </a:pPr>
+            <a:r>
+              <a:rPr lang="ja-JP" altLang="en-US" sz="3600" dirty="0" smtClean="0"/>
+              <a:t>処理つくるまでいきませんでした</a:t>
+            </a:r>
+            <a:endParaRPr lang="en-US" altLang="ja-JP" sz="3600" dirty="0" smtClean="0"/>
+          </a:p>
+        </p:txBody>
+      </p:sp>
+    </p:spTree>
+    <p:extLst>
+      <p:ext uri="{BB962C8B-B14F-4D97-AF65-F5344CB8AC3E}">
+        <p14:creationId xmlns:p14="http://schemas.microsoft.com/office/powerpoint/2010/main" val="2016892142"/>
+      </p:ext>
+    </p:extLst>
+  </p:cSld>
+  <p:clrMapOvr>
+    <a:masterClrMapping/>
+  </p:clrMapOvr>
+  <p:timing>
+    <p:tnLst>
+      <p:par>
+        <p:cTn id="1" dur="indefinite" restart="never" nodeType="tmRoot"/>
+      </p:par>
+    </p:tnLst>
+  </p:timing>
+</p:sld>
+</file>
+
+<file path=ppt/slides/slide21.xml><?xml version="1.0" encoding="utf-8"?>
+<p:sld xmlns:a="http://schemas.openxmlformats.org/drawingml/2006/main" xmlns:r="http://schemas.openxmlformats.org/officeDocument/2006/relationships" xmlns:p="http://schemas.openxmlformats.org/presentationml/2006/main">
+  <p:cSld>
+    <p:spTree>
+      <p:nvGrpSpPr>
+        <p:cNvPr id="1" name=""/>
+        <p:cNvGrpSpPr/>
+        <p:nvPr/>
+      </p:nvGrpSpPr>
+      <p:grpSpPr>
+        <a:xfrm>
+          <a:off x="0" y="0"/>
+          <a:ext cx="0" cy="0"/>
+          <a:chOff x="0" y="0"/>
+          <a:chExt cx="0" cy="0"/>
+        </a:xfrm>
+      </p:grpSpPr>
+      <p:sp>
+        <p:nvSpPr>
+          <p:cNvPr id="2" name="タイトル 1"/>
+          <p:cNvSpPr>
+            <a:spLocks noGrp="1"/>
+          </p:cNvSpPr>
+          <p:nvPr>
+            <p:ph type="title"/>
+          </p:nvPr>
+        </p:nvSpPr>
+        <p:spPr/>
+        <p:txBody>
+          <a:bodyPr/>
+          <a:lstStyle/>
+          <a:p>
+            <a:r>
+              <a:rPr kumimoji="1" lang="ja-JP" altLang="en-US" dirty="0" smtClean="0"/>
+              <a:t>感想２</a:t>
+            </a:r>
+            <a:endParaRPr kumimoji="1" lang="ja-JP" altLang="en-US" dirty="0"/>
+          </a:p>
+        </p:txBody>
+      </p:sp>
+      <p:sp>
+        <p:nvSpPr>
+          <p:cNvPr id="6" name="コンテンツ プレースホルダー 2"/>
+          <p:cNvSpPr>
+            <a:spLocks noGrp="1"/>
+          </p:cNvSpPr>
+          <p:nvPr>
+            <p:ph idx="1"/>
+          </p:nvPr>
+        </p:nvSpPr>
+        <p:spPr>
+          <a:xfrm>
+            <a:off x="1043608" y="1447800"/>
+            <a:ext cx="7890080" cy="5077544"/>
+          </a:xfrm>
+        </p:spPr>
+        <p:txBody>
+          <a:bodyPr>
+            <a:normAutofit/>
+          </a:bodyPr>
+          <a:lstStyle/>
+          <a:p>
+            <a:r>
+              <a:rPr kumimoji="1" lang="en-US" altLang="ja-JP" dirty="0" smtClean="0"/>
+              <a:t>Scheme</a:t>
+            </a:r>
+            <a:r>
+              <a:rPr kumimoji="1" lang="ja-JP" altLang="en-US" dirty="0" smtClean="0"/>
+              <a:t>言語</a:t>
+            </a:r>
+            <a:r>
+              <a:rPr kumimoji="1" lang="ja-JP" altLang="en-US" dirty="0" smtClean="0"/>
+              <a:t>難しい</a:t>
+            </a:r>
+            <a:endParaRPr kumimoji="1" lang="en-US" altLang="ja-JP" dirty="0" smtClean="0"/>
+          </a:p>
+          <a:p>
+            <a:endParaRPr lang="en-US" altLang="ja-JP" dirty="0"/>
+          </a:p>
+          <a:p>
+            <a:r>
+              <a:rPr lang="en-US" altLang="ja-JP" dirty="0"/>
+              <a:t>GIMP</a:t>
+            </a:r>
+            <a:r>
+              <a:rPr lang="ja-JP" altLang="en-US" dirty="0" err="1"/>
+              <a:t>に登</a:t>
+            </a:r>
+            <a:r>
+              <a:rPr lang="ja-JP" altLang="en-US" dirty="0"/>
+              <a:t>録するための呪文が</a:t>
+            </a:r>
+            <a:r>
+              <a:rPr lang="ja-JP" altLang="en-US" dirty="0" smtClean="0"/>
+              <a:t>長い</a:t>
+            </a:r>
+            <a:endParaRPr kumimoji="1" lang="en-US" altLang="ja-JP" dirty="0" smtClean="0"/>
+          </a:p>
+          <a:p>
+            <a:endParaRPr lang="en-US" altLang="ja-JP" dirty="0" smtClean="0"/>
+          </a:p>
+          <a:p>
+            <a:r>
+              <a:rPr lang="ja-JP" altLang="en-US" dirty="0" smtClean="0"/>
+              <a:t>もうちょっと調べてみたい</a:t>
+            </a:r>
+            <a:endParaRPr lang="en-US" altLang="ja-JP" dirty="0"/>
+          </a:p>
+        </p:txBody>
+      </p:sp>
+    </p:spTree>
+    <p:extLst>
+      <p:ext uri="{BB962C8B-B14F-4D97-AF65-F5344CB8AC3E}">
+        <p14:creationId xmlns:p14="http://schemas.microsoft.com/office/powerpoint/2010/main" val="658832179"/>
+      </p:ext>
+    </p:extLst>
+  </p:cSld>
+  <p:clrMapOvr>
+    <a:masterClrMapping/>
+  </p:clrMapOvr>
+</p:sld>
+</file>
+
+<file path=ppt/slides/slide22.xml><?xml version="1.0" encoding="utf-8"?>
+<p:sld xmlns:a="http://schemas.openxmlformats.org/drawingml/2006/main" xmlns:r="http://schemas.openxmlformats.org/officeDocument/2006/relationships" xmlns:p="http://schemas.openxmlformats.org/presentationml/2006/main">
+  <p:cSld>
+    <p:spTree>
+      <p:nvGrpSpPr>
+        <p:cNvPr id="1" name=""/>
+        <p:cNvGrpSpPr/>
+        <p:nvPr/>
+      </p:nvGrpSpPr>
+      <p:grpSpPr>
+        <a:xfrm>
+          <a:off x="0" y="0"/>
+          <a:ext cx="0" cy="0"/>
+          <a:chOff x="0" y="0"/>
+          <a:chExt cx="0" cy="0"/>
+        </a:xfrm>
+      </p:grpSpPr>
+      <p:sp>
+        <p:nvSpPr>
+          <p:cNvPr id="3" name="コンテンツ プレースホルダー 2"/>
+          <p:cNvSpPr>
+            <a:spLocks noGrp="1"/>
+          </p:cNvSpPr>
+          <p:nvPr>
+            <p:ph idx="1"/>
+          </p:nvPr>
+        </p:nvSpPr>
+        <p:spPr>
+          <a:xfrm>
+            <a:off x="1043608" y="1412776"/>
+            <a:ext cx="7786112" cy="4800600"/>
+          </a:xfrm>
+        </p:spPr>
+        <p:txBody>
+          <a:bodyPr>
+            <a:normAutofit/>
+          </a:bodyPr>
+          <a:lstStyle/>
+          <a:p>
+            <a:pPr marL="82296" indent="0">
+              <a:buNone/>
+            </a:pPr>
+            <a:r>
+              <a:rPr lang="ja-JP" altLang="en-US" dirty="0" smtClean="0"/>
+              <a:t>日本語ドキュメント</a:t>
+            </a:r>
+            <a:endParaRPr lang="en-US" altLang="ja-JP" dirty="0" smtClean="0"/>
+          </a:p>
+          <a:p>
+            <a:pPr marL="82296" indent="0">
+              <a:buNone/>
+            </a:pPr>
+            <a:r>
+              <a:rPr lang="en-US" altLang="ja-JP" dirty="0"/>
+              <a:t>https://docs.gimp.org/ja/index.html</a:t>
+            </a:r>
+          </a:p>
+          <a:p>
+            <a:pPr marL="82296" indent="0">
+              <a:buNone/>
+            </a:pPr>
+            <a:endParaRPr lang="en-US" altLang="ja-JP" dirty="0" smtClean="0"/>
+          </a:p>
+        </p:txBody>
+      </p:sp>
+      <p:sp>
+        <p:nvSpPr>
+          <p:cNvPr id="4" name="タイトル 3"/>
+          <p:cNvSpPr>
+            <a:spLocks noGrp="1"/>
+          </p:cNvSpPr>
+          <p:nvPr>
+            <p:ph type="title"/>
+          </p:nvPr>
+        </p:nvSpPr>
+        <p:spPr/>
+        <p:txBody>
+          <a:bodyPr>
+            <a:normAutofit/>
+          </a:bodyPr>
+          <a:lstStyle/>
+          <a:p>
+            <a:r>
+              <a:rPr kumimoji="1" lang="ja-JP" altLang="en-US" dirty="0" smtClean="0"/>
+              <a:t>参考</a:t>
+            </a:r>
+            <a:endParaRPr kumimoji="1" lang="ja-JP" altLang="en-US" dirty="0"/>
+          </a:p>
+        </p:txBody>
+      </p:sp>
+    </p:spTree>
+    <p:extLst>
+      <p:ext uri="{BB962C8B-B14F-4D97-AF65-F5344CB8AC3E}">
+        <p14:creationId xmlns:p14="http://schemas.microsoft.com/office/powerpoint/2010/main" val="3783224327"/>
+      </p:ext>
+    </p:extLst>
+  </p:cSld>
+  <p:clrMapOvr>
+    <a:masterClrMapping/>
+  </p:clrMapOvr>
+  <p:timing>
+    <p:tnLst>
+      <p:par>
+        <p:cTn id="1" dur="indefinite" restart="never" nodeType="tmRoot"/>
+      </p:par>
+    </p:tnLst>
+  </p:timing>
+</p:sld>
+</file>
+
+<file path=ppt/slides/slide23.xml><?xml version="1.0" encoding="utf-8"?>
+<p:sld xmlns:a="http://schemas.openxmlformats.org/drawingml/2006/main" xmlns:r="http://schemas.openxmlformats.org/officeDocument/2006/relationships" xmlns:p="http://schemas.openxmlformats.org/presentationml/2006/main">
+  <p:cSld>
+    <p:spTree>
+      <p:nvGrpSpPr>
+        <p:cNvPr id="1" name=""/>
+        <p:cNvGrpSpPr/>
+        <p:nvPr/>
+      </p:nvGrpSpPr>
+      <p:grpSpPr>
+        <a:xfrm>
+          <a:off x="0" y="0"/>
+          <a:ext cx="0" cy="0"/>
+          <a:chOff x="0" y="0"/>
+          <a:chExt cx="0" cy="0"/>
+        </a:xfrm>
+      </p:grpSpPr>
+      <p:sp>
+        <p:nvSpPr>
           <p:cNvPr id="3" name="コンテンツ プレースホルダー 2"/>
           <p:cNvSpPr>
             <a:spLocks noGrp="1"/>
@@ -6153,9 +7155,19 @@
             <a:pPr marL="82296" indent="0" algn="ctr">
               <a:buNone/>
             </a:pPr>
+            <a:endParaRPr lang="en-US" altLang="ja-JP" dirty="0" smtClean="0"/>
+          </a:p>
+          <a:p>
+            <a:pPr marL="82296" indent="0" algn="ctr">
+              <a:buNone/>
+            </a:pPr>
             <a:r>
               <a:rPr lang="ja-JP" altLang="en-US" dirty="0" smtClean="0"/>
-              <a:t>最近手順書作成とかで</a:t>
+              <a:t>最近</a:t>
+            </a:r>
+            <a:r>
+              <a:rPr lang="ja-JP" altLang="en-US" dirty="0" smtClean="0"/>
+              <a:t>手順書作成とかで</a:t>
             </a:r>
             <a:endParaRPr lang="en-US" altLang="ja-JP" dirty="0" smtClean="0"/>
           </a:p>
@@ -6212,7 +7224,7 @@
         </p:nvSpPr>
         <p:spPr>
           <a:xfrm>
-            <a:off x="4211960" y="2827106"/>
+            <a:off x="4211960" y="3215407"/>
             <a:ext cx="936104" cy="720080"/>
           </a:xfrm>
           <a:prstGeom prst="downArrow">
@@ -6317,7 +7329,7 @@
         <p:spPr>
           <a:xfrm>
             <a:off x="899592" y="1447800"/>
-            <a:ext cx="8136904" cy="4069432"/>
+            <a:ext cx="8136904" cy="5410200"/>
           </a:xfrm>
         </p:spPr>
         <p:txBody>
@@ -6383,24 +7395,7 @@
             <a:pPr marL="82296" indent="0">
               <a:buNone/>
             </a:pPr>
-            <a:endParaRPr kumimoji="1" lang="en-US" altLang="ja-JP" sz="3600" dirty="0"/>
-          </a:p>
-          <a:p>
-            <a:pPr marL="82296" indent="0">
-              <a:buNone/>
-            </a:pPr>
-            <a:r>
-              <a:rPr lang="en-US" altLang="ja-JP" sz="1100" dirty="0"/>
-              <a:t>(</a:t>
-            </a:r>
-            <a:r>
-              <a:rPr lang="ja-JP" altLang="en-US" sz="1100" dirty="0"/>
-              <a:t>これだけ</a:t>
-            </a:r>
-            <a:r>
-              <a:rPr lang="en-US" altLang="ja-JP" sz="1100" dirty="0"/>
-              <a:t>)</a:t>
-            </a:r>
+            <a:endParaRPr lang="en-US" altLang="ja-JP" sz="3600" dirty="0"/>
           </a:p>
         </p:txBody>
       </p:sp>
@@ -6664,7 +7659,7 @@
           <a:p>
             <a:r>
               <a:rPr kumimoji="1" lang="ja-JP" altLang="en-US" dirty="0" smtClean="0"/>
-              <a:t>やりたいこと</a:t>
+              <a:t>右クリック→編集だけでこれ</a:t>
             </a:r>
             <a:endParaRPr kumimoji="1" lang="ja-JP" altLang="en-US" dirty="0"/>
           </a:p>
@@ -6692,55 +7687,53 @@
           </a:bodyPr>
           <a:lstStyle/>
           <a:p>
-            <a:pPr marL="82296" indent="0">
-              <a:buNone/>
-            </a:pPr>
-            <a:r>
-              <a:rPr lang="ja-JP" altLang="en-US" sz="3600" dirty="0"/>
-              <a:t>①</a:t>
-            </a:r>
-            <a:r>
-              <a:rPr kumimoji="1" lang="ja-JP" altLang="en-US" sz="3600" dirty="0" smtClean="0"/>
-              <a:t>画像の一部だけ切り出す</a:t>
-            </a:r>
-            <a:endParaRPr kumimoji="1" lang="en-US" altLang="ja-JP" sz="3600" dirty="0" smtClean="0"/>
-          </a:p>
-          <a:p>
-            <a:pPr marL="82296" indent="0">
-              <a:buNone/>
-            </a:pPr>
-            <a:endParaRPr lang="en-US" altLang="ja-JP" sz="3600" dirty="0" smtClean="0"/>
-          </a:p>
-          <a:p>
-            <a:pPr marL="82296" indent="0">
-              <a:buNone/>
-            </a:pPr>
-            <a:r>
-              <a:rPr lang="ja-JP" altLang="en-US" dirty="0"/>
-              <a:t>範囲</a:t>
-            </a:r>
-            <a:r>
-              <a:rPr lang="ja-JP" altLang="en-US" dirty="0" smtClean="0"/>
-              <a:t>選択→右クリックメニュー</a:t>
-            </a:r>
-            <a:endParaRPr lang="en-US" altLang="ja-JP" dirty="0" smtClean="0"/>
-          </a:p>
-          <a:p>
-            <a:pPr marL="82296" indent="0">
-              <a:buNone/>
-            </a:pPr>
-            <a:r>
-              <a:rPr lang="ja-JP" altLang="en-US" dirty="0" smtClean="0"/>
-              <a:t>→画像→キャンバスを選択範囲に合わせる</a:t>
-            </a:r>
-            <a:endParaRPr lang="en-US" altLang="ja-JP" dirty="0"/>
-          </a:p>
-        </p:txBody>
-      </p:sp>
+            <a:pPr marL="82296" indent="0" algn="ctr">
+              <a:buNone/>
+            </a:pPr>
+            <a:endParaRPr kumimoji="1" lang="en-US" altLang="ja-JP" sz="4400" dirty="0" smtClean="0"/>
+          </a:p>
+          <a:p>
+            <a:pPr marL="82296" indent="0" algn="ctr">
+              <a:buNone/>
+            </a:pPr>
+            <a:endParaRPr kumimoji="1" lang="en-US" altLang="ja-JP" sz="4400" dirty="0" smtClean="0"/>
+          </a:p>
+        </p:txBody>
+      </p:sp>
+      <p:pic>
+        <p:nvPicPr>
+          <p:cNvPr id="5" name="図 4"/>
+          <p:cNvPicPr>
+            <a:picLocks noChangeAspect="1"/>
+          </p:cNvPicPr>
+          <p:nvPr/>
+        </p:nvPicPr>
+        <p:blipFill>
+          <a:blip r:embed="rId2">
+            <a:extLst>
+              <a:ext uri="{28A0092B-C50C-407E-A947-70E740481C1C}">
+                <a14:useLocalDpi xmlns:a14="http://schemas.microsoft.com/office/drawing/2010/main" val="0"/>
+              </a:ext>
+            </a:extLst>
+          </a:blip>
+          <a:stretch>
+            <a:fillRect/>
+          </a:stretch>
+        </p:blipFill>
+        <p:spPr>
+          <a:xfrm>
+            <a:off x="539552" y="1417638"/>
+            <a:ext cx="8194812" cy="5221811"/>
+          </a:xfrm>
+          <a:prstGeom prst="rect">
+            <a:avLst/>
+          </a:prstGeom>
+        </p:spPr>
+      </p:pic>
     </p:spTree>
     <p:extLst>
       <p:ext uri="{BB962C8B-B14F-4D97-AF65-F5344CB8AC3E}">
-        <p14:creationId xmlns:p14="http://schemas.microsoft.com/office/powerpoint/2010/main" val="2265432557"/>
+        <p14:creationId xmlns:p14="http://schemas.microsoft.com/office/powerpoint/2010/main" val="988596583"/>
       </p:ext>
     </p:extLst>
   </p:cSld>
@@ -6823,60 +7816,44 @@
               <a:buNone/>
             </a:pPr>
             <a:r>
-              <a:rPr lang="ja-JP" altLang="en-US" sz="3600" dirty="0" smtClean="0"/>
-              <a:t>②特定の部分を黒く塗る</a:t>
-            </a:r>
+              <a:rPr lang="ja-JP" altLang="en-US" sz="3600" dirty="0"/>
+              <a:t>①</a:t>
+            </a:r>
+            <a:r>
+              <a:rPr kumimoji="1" lang="ja-JP" altLang="en-US" sz="3600" dirty="0" smtClean="0"/>
+              <a:t>画像の一部だけ切り出す</a:t>
+            </a:r>
+            <a:endParaRPr kumimoji="1" lang="en-US" altLang="ja-JP" sz="3600" dirty="0" smtClean="0"/>
+          </a:p>
+          <a:p>
+            <a:pPr marL="82296" indent="0">
+              <a:buNone/>
+            </a:pPr>
             <a:endParaRPr lang="en-US" altLang="ja-JP" sz="3600" dirty="0" smtClean="0"/>
           </a:p>
           <a:p>
             <a:pPr marL="82296" indent="0">
               <a:buNone/>
             </a:pPr>
-            <a:endParaRPr kumimoji="1" lang="en-US" altLang="ja-JP" sz="3600" dirty="0" smtClean="0"/>
-          </a:p>
-          <a:p>
-            <a:pPr marL="82296" indent="0">
-              <a:buNone/>
-            </a:pPr>
-            <a:r>
-              <a:rPr lang="ja-JP" altLang="en-US" sz="3600" dirty="0"/>
+            <a:r>
+              <a:rPr lang="ja-JP" altLang="en-US" dirty="0"/>
               <a:t>範囲</a:t>
             </a:r>
             <a:r>
-              <a:rPr lang="ja-JP" altLang="en-US" sz="3600" dirty="0" smtClean="0"/>
+              <a:rPr lang="ja-JP" altLang="en-US" dirty="0" smtClean="0"/>
               <a:t>選択→右クリックメニュー</a:t>
             </a:r>
-            <a:endParaRPr lang="en-US" altLang="ja-JP" sz="3600" dirty="0" smtClean="0"/>
-          </a:p>
-          <a:p>
-            <a:pPr marL="82296" indent="0">
-              <a:buNone/>
-            </a:pPr>
-            <a:r>
-              <a:rPr kumimoji="1" lang="ja-JP" altLang="en-US" sz="3600" dirty="0" smtClean="0"/>
-              <a:t>→編集→描画色で塗りつぶす</a:t>
-            </a:r>
-            <a:endParaRPr kumimoji="1" lang="en-US" altLang="ja-JP" sz="3600" dirty="0" smtClean="0"/>
-          </a:p>
-          <a:p>
-            <a:pPr marL="82296" indent="0">
-              <a:buNone/>
-            </a:pPr>
-            <a:endParaRPr kumimoji="1" lang="en-US" altLang="ja-JP" sz="3600" dirty="0" smtClean="0"/>
-          </a:p>
-          <a:p>
-            <a:pPr marL="82296" indent="0">
-              <a:buNone/>
-            </a:pPr>
-            <a:r>
-              <a:rPr lang="en-US" altLang="ja-JP" sz="3600" dirty="0" smtClean="0"/>
-              <a:t>※</a:t>
-            </a:r>
-            <a:r>
-              <a:rPr lang="ja-JP" altLang="en-US" sz="3600" dirty="0" smtClean="0"/>
-              <a:t>あらかじめ描画色を黒にしておく</a:t>
-            </a:r>
-            <a:endParaRPr kumimoji="1" lang="en-US" altLang="ja-JP" sz="3600" dirty="0" smtClean="0"/>
+            <a:endParaRPr lang="en-US" altLang="ja-JP" dirty="0" smtClean="0"/>
+          </a:p>
+          <a:p>
+            <a:pPr marL="82296" indent="0">
+              <a:buNone/>
+            </a:pPr>
+            <a:r>
+              <a:rPr lang="ja-JP" altLang="en-US" dirty="0" smtClean="0"/>
+              <a:t>→画像→キャンバスを選択範囲に合わせる</a:t>
+            </a:r>
+            <a:endParaRPr lang="en-US" altLang="ja-JP" dirty="0"/>
           </a:p>
         </p:txBody>
       </p:sp>
@@ -6967,7 +7944,7 @@
             </a:pPr>
             <a:r>
               <a:rPr lang="ja-JP" altLang="en-US" sz="3600" dirty="0" smtClean="0"/>
-              <a:t>③モザイク処理とかできたら面白そう</a:t>
+              <a:t>②特定の部分を黒く塗る</a:t>
             </a:r>
             <a:endParaRPr lang="en-US" altLang="ja-JP" sz="3600" dirty="0" smtClean="0"/>
           </a:p>
@@ -6975,15 +7952,19 @@
             <a:pPr marL="82296" indent="0">
               <a:buNone/>
             </a:pPr>
-            <a:endParaRPr lang="en-US" altLang="ja-JP" sz="3600" dirty="0"/>
-          </a:p>
-          <a:p>
-            <a:pPr marL="82296" indent="0">
-              <a:buNone/>
-            </a:pPr>
+            <a:endParaRPr kumimoji="1" lang="en-US" altLang="ja-JP" sz="3600" dirty="0" smtClean="0"/>
+          </a:p>
+          <a:p>
+            <a:pPr marL="82296" indent="0">
+              <a:buNone/>
+            </a:pPr>
+            <a:r>
+              <a:rPr lang="ja-JP" altLang="en-US" sz="3600" dirty="0"/>
+              <a:t>範囲</a:t>
+            </a:r>
             <a:r>
               <a:rPr lang="ja-JP" altLang="en-US" sz="3600" dirty="0" smtClean="0"/>
-              <a:t>範囲選択→右クリックメニュー</a:t>
+              <a:t>選択→右クリックメニュー</a:t>
             </a:r>
             <a:endParaRPr lang="en-US" altLang="ja-JP" sz="3600" dirty="0" smtClean="0"/>
           </a:p>
@@ -6992,10 +7973,38 @@
               <a:buNone/>
             </a:pPr>
             <a:r>
+              <a:rPr kumimoji="1" lang="ja-JP" altLang="en-US" sz="3600" dirty="0" smtClean="0"/>
+              <a:t>→編集→描画色で塗りつぶす</a:t>
+            </a:r>
+            <a:endParaRPr kumimoji="1" lang="en-US" altLang="ja-JP" sz="3600" dirty="0" smtClean="0"/>
+          </a:p>
+          <a:p>
+            <a:pPr marL="82296" indent="0">
+              <a:buNone/>
+            </a:pPr>
+            <a:endParaRPr kumimoji="1" lang="en-US" altLang="ja-JP" sz="3600" dirty="0" smtClean="0"/>
+          </a:p>
+          <a:p>
+            <a:pPr marL="82296" indent="0">
+              <a:buNone/>
+            </a:pPr>
+            <a:r>
+              <a:rPr lang="en-US" altLang="ja-JP" sz="3600" dirty="0" smtClean="0"/>
+              <a:t>※</a:t>
+            </a:r>
+            <a:r>
               <a:rPr lang="ja-JP" altLang="en-US" sz="3600" dirty="0" smtClean="0"/>
-              <a:t>→フィルター→ぼかし→モザイク処理</a:t>
-            </a:r>
-            <a:endParaRPr lang="en-US" altLang="ja-JP" sz="3600" dirty="0" smtClean="0"/>
+              <a:t>あらかじめ描画色</a:t>
+            </a:r>
+            <a:r>
+              <a:rPr lang="ja-JP" altLang="en-US" sz="3600" dirty="0" smtClean="0"/>
+              <a:t>を塗りたい色に</a:t>
+            </a:r>
+            <a:r>
+              <a:rPr lang="ja-JP" altLang="en-US" sz="3600" dirty="0" smtClean="0"/>
+              <a:t>しておく</a:t>
+            </a:r>
+            <a:endParaRPr kumimoji="1" lang="en-US" altLang="ja-JP" sz="3600" dirty="0" smtClean="0"/>
           </a:p>
         </p:txBody>
       </p:sp>
@@ -7060,80 +8069,16 @@
         <a:srgbClr val="AA8A14"/>
       </a:folHlink>
     </a:clrScheme>
-    <a:fontScheme name="フレッシュ">
+    <a:fontScheme name="Meiryo UI">
       <a:majorFont>
-        <a:latin typeface="Gill Sans MT"/>
-        <a:ea typeface=""/>
+        <a:latin typeface="Meiryo UI"/>
+        <a:ea typeface="Meiryo UI"/>
         <a:cs typeface=""/>
-        <a:font script="Grek" typeface="Corbel"/>
-        <a:font script="Cyrl" typeface="Corbel"/>
-        <a:font script="Jpan" typeface="HGｺﾞｼｯｸE"/>
-        <a:font script="Hang" typeface="휴먼매직체"/>
-        <a:font script="Hans" typeface="华文中宋"/>
-        <a:font script="Hant" typeface="微軟正黑體"/>
-        <a:font script="Arab" typeface="Majalla UI"/>
-        <a:font script="Hebr" typeface="Arial"/>
-        <a:font script="Thai" typeface="Cordia New"/>
-        <a:font script="Ethi" typeface="Nyala"/>
-        <a:font script="Beng" typeface="Vrinda"/>
-        <a:font script="Gujr" typeface="Shruti"/>
-        <a:font script="Khmr" typeface="DaunPenh"/>
-        <a:font script="Knda" typeface="Tunga"/>
-        <a:font script="Guru" typeface="Raavi"/>
-        <a:font script="Cans" typeface="Euphemia"/>
-        <a:font script="Cher" typeface="Plantagenet Cherokee"/>
-        <a:font script="Yiii" typeface="Microsoft Yi Baiti"/>
-        <a:font script="Tibt" typeface="Microsoft Himalaya"/>
-        <a:font script="Thaa" typeface="MV Boli"/>
-        <a:font script="Deva" typeface="Mangal"/>
-        <a:font script="Telu" typeface="Gautami"/>
-        <a:font script="Taml" typeface="Latha"/>
-        <a:font script="Syrc" typeface="Estrangelo Edessa"/>
-        <a:font script="Orya" typeface="Kalinga"/>
-        <a:font script="Mlym" typeface="Kartika"/>
-        <a:font script="Laoo" typeface="DokChampa"/>
-        <a:font script="Sinh" typeface="Iskoola Pota"/>
-        <a:font script="Mong" typeface="Mongolian Baiti"/>
-        <a:font script="Viet" typeface="Tahoma"/>
-        <a:font script="Uigh" typeface="Microsoft Uighur"/>
-        <a:font script="Geor" typeface="Sylfaen"/>
       </a:majorFont>
       <a:minorFont>
-        <a:latin typeface="Gill Sans MT"/>
-        <a:ea typeface=""/>
+        <a:latin typeface="Meiryo UI"/>
+        <a:ea typeface="Meiryo UI"/>
         <a:cs typeface=""/>
-        <a:font script="Grek" typeface="Corbel"/>
-        <a:font script="Cyrl" typeface="Corbel"/>
-        <a:font script="Jpan" typeface="HGｺﾞｼｯｸE"/>
-        <a:font script="Hang" typeface="HY엽서L"/>
-        <a:font script="Hans" typeface="华文中宋"/>
-        <a:font script="Hant" typeface="微軟正黑體"/>
-        <a:font script="Arab" typeface="Majalla UI"/>
-        <a:font script="Hebr" typeface="Arial"/>
-        <a:font script="Thai" typeface="Cordia New"/>
-        <a:font script="Ethi" typeface="Nyala"/>
-        <a:font script="Beng" typeface="Vrinda"/>
-        <a:font script="Gujr" typeface="Shruti"/>
-        <a:font script="Khmr" typeface="DaunPenh"/>
-        <a:font script="Knda" typeface="Tunga"/>
-        <a:font script="Guru" typeface="Raavi"/>
-        <a:font script="Cans" typeface="Euphemia"/>
-        <a:font script="Cher" typeface="Plantagenet Cherokee"/>
-        <a:font script="Yiii" typeface="Microsoft Yi Baiti"/>
-        <a:font script="Tibt" typeface="Microsoft Himalaya"/>
-        <a:font script="Thaa" typeface="MV Boli"/>
-        <a:font script="Deva" typeface="Mangal"/>
-        <a:font script="Telu" typeface="Gautami"/>
-        <a:font script="Taml" typeface="Latha"/>
-        <a:font script="Syrc" typeface="Estrangelo Edessa"/>
-        <a:font script="Orya" typeface="Kalinga"/>
-        <a:font script="Mlym" typeface="Kartika"/>
-        <a:font script="Laoo" typeface="DokChampa"/>
-        <a:font script="Sinh" typeface="Iskoola Pota"/>
-        <a:font script="Mong" typeface="Mongolian Baiti"/>
-        <a:font script="Viet" typeface="Tahoma"/>
-        <a:font script="Uigh" typeface="Microsoft Uighur"/>
-        <a:font script="Geor" typeface="Sylfaen"/>
       </a:minorFont>
     </a:fontScheme>
     <a:fmtScheme name="フレッシュ">

</xml_diff>